<commit_message>
updated scripts for original 10 trios to repeat illumina analysis
</commit_message>
<xml_diff>
--- a/manuscript/long_read_DNV_figures.pptx
+++ b/manuscript/long_read_DNV_figures.pptx
@@ -4678,7 +4678,7 @@
           <p:nvPr>
             <p:extLst>
               <p:ext uri="{D42A27DB-BD31-4B8C-83A1-F6EECF244321}">
-                <p14:modId xmlns:p14="http://schemas.microsoft.com/office/powerpoint/2010/main" val="1466301473"/>
+                <p14:modId xmlns:p14="http://schemas.microsoft.com/office/powerpoint/2010/main" val="1519841008"/>
               </p:ext>
             </p:extLst>
           </p:nvPr>
@@ -5242,14 +5242,14 @@
                     <a:p>
                       <a:pPr algn="ctr" fontAlgn="b"/>
                       <a:r>
-                        <a:rPr lang="en-US" sz="1000" b="1" u="none" strike="noStrike" dirty="0">
+                        <a:rPr lang="en-US" sz="1000" b="0" u="none" strike="noStrike" dirty="0">
                           <a:effectLst/>
                           <a:latin typeface="Arial" panose="020B0604020202020204" pitchFamily="34" charset="0"/>
                           <a:cs typeface="Arial" panose="020B0604020202020204" pitchFamily="34" charset="0"/>
                         </a:rPr>
                         <a:t>0.01</a:t>
                       </a:r>
-                      <a:endParaRPr lang="en-US" sz="1000" b="1" i="0" u="none" strike="noStrike" dirty="0">
+                      <a:endParaRPr lang="en-US" sz="1000" b="0" i="0" u="none" strike="noStrike" dirty="0">
                         <a:solidFill>
                           <a:srgbClr val="000000"/>
                         </a:solidFill>

</xml_diff>

<commit_message>
added scripts for replication timing and updated manuscript
</commit_message>
<xml_diff>
--- a/manuscript/long_read_DNV_figures.pptx
+++ b/manuscript/long_read_DNV_figures.pptx
@@ -10,6 +10,8 @@
     <p:sldId id="319" r:id="rId4"/>
     <p:sldId id="326" r:id="rId5"/>
     <p:sldId id="260" r:id="rId6"/>
+    <p:sldId id="328" r:id="rId7"/>
+    <p:sldId id="330" r:id="rId8"/>
   </p:sldIdLst>
   <p:sldSz cx="9144000" cy="5143500" type="screen16x9"/>
   <p:notesSz cx="6858000" cy="9144000"/>
@@ -247,7 +249,7 @@
           <a:p>
             <a:fld id="{91125946-127D-464D-9662-C3A399AB15E3}" type="datetimeFigureOut">
               <a:rPr lang="en-US" smtClean="0"/>
-              <a:t>1/24/19</a:t>
+              <a:t>2/8/19</a:t>
             </a:fld>
             <a:endParaRPr lang="en-US"/>
           </a:p>
@@ -417,7 +419,7 @@
           <a:p>
             <a:fld id="{91125946-127D-464D-9662-C3A399AB15E3}" type="datetimeFigureOut">
               <a:rPr lang="en-US" smtClean="0"/>
-              <a:t>1/24/19</a:t>
+              <a:t>2/8/19</a:t>
             </a:fld>
             <a:endParaRPr lang="en-US"/>
           </a:p>
@@ -597,7 +599,7 @@
           <a:p>
             <a:fld id="{91125946-127D-464D-9662-C3A399AB15E3}" type="datetimeFigureOut">
               <a:rPr lang="en-US" smtClean="0"/>
-              <a:t>1/24/19</a:t>
+              <a:t>2/8/19</a:t>
             </a:fld>
             <a:endParaRPr lang="en-US"/>
           </a:p>
@@ -767,7 +769,7 @@
           <a:p>
             <a:fld id="{91125946-127D-464D-9662-C3A399AB15E3}" type="datetimeFigureOut">
               <a:rPr lang="en-US" smtClean="0"/>
-              <a:t>1/24/19</a:t>
+              <a:t>2/8/19</a:t>
             </a:fld>
             <a:endParaRPr lang="en-US"/>
           </a:p>
@@ -1013,7 +1015,7 @@
           <a:p>
             <a:fld id="{91125946-127D-464D-9662-C3A399AB15E3}" type="datetimeFigureOut">
               <a:rPr lang="en-US" smtClean="0"/>
-              <a:t>1/24/19</a:t>
+              <a:t>2/8/19</a:t>
             </a:fld>
             <a:endParaRPr lang="en-US"/>
           </a:p>
@@ -1245,7 +1247,7 @@
           <a:p>
             <a:fld id="{91125946-127D-464D-9662-C3A399AB15E3}" type="datetimeFigureOut">
               <a:rPr lang="en-US" smtClean="0"/>
-              <a:t>1/24/19</a:t>
+              <a:t>2/8/19</a:t>
             </a:fld>
             <a:endParaRPr lang="en-US"/>
           </a:p>
@@ -1612,7 +1614,7 @@
           <a:p>
             <a:fld id="{91125946-127D-464D-9662-C3A399AB15E3}" type="datetimeFigureOut">
               <a:rPr lang="en-US" smtClean="0"/>
-              <a:t>1/24/19</a:t>
+              <a:t>2/8/19</a:t>
             </a:fld>
             <a:endParaRPr lang="en-US"/>
           </a:p>
@@ -1730,7 +1732,7 @@
           <a:p>
             <a:fld id="{91125946-127D-464D-9662-C3A399AB15E3}" type="datetimeFigureOut">
               <a:rPr lang="en-US" smtClean="0"/>
-              <a:t>1/24/19</a:t>
+              <a:t>2/8/19</a:t>
             </a:fld>
             <a:endParaRPr lang="en-US"/>
           </a:p>
@@ -1825,7 +1827,7 @@
           <a:p>
             <a:fld id="{91125946-127D-464D-9662-C3A399AB15E3}" type="datetimeFigureOut">
               <a:rPr lang="en-US" smtClean="0"/>
-              <a:t>1/24/19</a:t>
+              <a:t>2/8/19</a:t>
             </a:fld>
             <a:endParaRPr lang="en-US"/>
           </a:p>
@@ -2102,7 +2104,7 @@
           <a:p>
             <a:fld id="{91125946-127D-464D-9662-C3A399AB15E3}" type="datetimeFigureOut">
               <a:rPr lang="en-US" smtClean="0"/>
-              <a:t>1/24/19</a:t>
+              <a:t>2/8/19</a:t>
             </a:fld>
             <a:endParaRPr lang="en-US"/>
           </a:p>
@@ -2359,7 +2361,7 @@
           <a:p>
             <a:fld id="{91125946-127D-464D-9662-C3A399AB15E3}" type="datetimeFigureOut">
               <a:rPr lang="en-US" smtClean="0"/>
-              <a:t>1/24/19</a:t>
+              <a:t>2/8/19</a:t>
             </a:fld>
             <a:endParaRPr lang="en-US"/>
           </a:p>
@@ -2574,7 +2576,7 @@
             <a:fld id="{91125946-127D-464D-9662-C3A399AB15E3}" type="datetimeFigureOut">
               <a:rPr lang="en-US" smtClean="0"/>
               <a:pPr/>
-              <a:t>1/24/19</a:t>
+              <a:t>2/8/19</a:t>
             </a:fld>
             <a:endParaRPr lang="en-US" dirty="0"/>
           </a:p>
@@ -5878,7 +5880,7 @@
         </p:blipFill>
         <p:spPr>
           <a:xfrm>
-            <a:off x="898902" y="125177"/>
+            <a:off x="705173" y="1148065"/>
             <a:ext cx="7529776" cy="2258933"/>
           </a:xfrm>
           <a:prstGeom prst="rect">
@@ -5886,84 +5888,6 @@
           </a:prstGeom>
         </p:spPr>
       </p:pic>
-      <p:sp>
-        <p:nvSpPr>
-          <p:cNvPr id="5" name="TextBox 4">
-            <a:extLst>
-              <a:ext uri="{FF2B5EF4-FFF2-40B4-BE49-F238E27FC236}">
-                <a16:creationId xmlns:a16="http://schemas.microsoft.com/office/drawing/2014/main" id="{C80D86E1-A5D7-5840-BACD-AA185513F02F}"/>
-              </a:ext>
-            </a:extLst>
-          </p:cNvPr>
-          <p:cNvSpPr txBox="1"/>
-          <p:nvPr/>
-        </p:nvSpPr>
-        <p:spPr>
-          <a:xfrm>
-            <a:off x="379527" y="218167"/>
-            <a:ext cx="396262" cy="300082"/>
-          </a:xfrm>
-          <a:prstGeom prst="rect">
-            <a:avLst/>
-          </a:prstGeom>
-          <a:noFill/>
-        </p:spPr>
-        <p:txBody>
-          <a:bodyPr wrap="none" rtlCol="0">
-            <a:spAutoFit/>
-          </a:bodyPr>
-          <a:lstStyle/>
-          <a:p>
-            <a:r>
-              <a:rPr lang="en-US" b="1" dirty="0">
-                <a:latin typeface="Arial" charset="0"/>
-                <a:ea typeface="Arial" charset="0"/>
-                <a:cs typeface="Arial" charset="0"/>
-              </a:rPr>
-              <a:t>(a)</a:t>
-            </a:r>
-          </a:p>
-        </p:txBody>
-      </p:sp>
-      <p:sp>
-        <p:nvSpPr>
-          <p:cNvPr id="6" name="TextBox 5">
-            <a:extLst>
-              <a:ext uri="{FF2B5EF4-FFF2-40B4-BE49-F238E27FC236}">
-                <a16:creationId xmlns:a16="http://schemas.microsoft.com/office/drawing/2014/main" id="{B3C245FE-51DC-114A-B3D9-AA6B504902FF}"/>
-              </a:ext>
-            </a:extLst>
-          </p:cNvPr>
-          <p:cNvSpPr txBox="1"/>
-          <p:nvPr/>
-        </p:nvSpPr>
-        <p:spPr>
-          <a:xfrm>
-            <a:off x="374718" y="2223908"/>
-            <a:ext cx="405880" cy="300082"/>
-          </a:xfrm>
-          <a:prstGeom prst="rect">
-            <a:avLst/>
-          </a:prstGeom>
-          <a:noFill/>
-        </p:spPr>
-        <p:txBody>
-          <a:bodyPr wrap="none" rtlCol="0">
-            <a:spAutoFit/>
-          </a:bodyPr>
-          <a:lstStyle/>
-          <a:p>
-            <a:r>
-              <a:rPr lang="en-US" b="1" dirty="0">
-                <a:latin typeface="Arial" charset="0"/>
-                <a:ea typeface="Arial" charset="0"/>
-                <a:cs typeface="Arial" charset="0"/>
-              </a:rPr>
-              <a:t>(b)</a:t>
-            </a:r>
-          </a:p>
-        </p:txBody>
-      </p:sp>
     </p:spTree>
     <p:extLst>
       <p:ext uri="{BB962C8B-B14F-4D97-AF65-F5344CB8AC3E}">
@@ -6538,6 +6462,1345 @@
 </p:sld>
 </file>
 
+<file path=ppt/slides/slide6.xml><?xml version="1.0" encoding="utf-8"?>
+<p:sld xmlns:a="http://schemas.openxmlformats.org/drawingml/2006/main" xmlns:r="http://schemas.openxmlformats.org/officeDocument/2006/relationships" xmlns:p="http://schemas.openxmlformats.org/presentationml/2006/main">
+  <p:cSld>
+    <p:spTree>
+      <p:nvGrpSpPr>
+        <p:cNvPr id="1" name=""/>
+        <p:cNvGrpSpPr/>
+        <p:nvPr/>
+      </p:nvGrpSpPr>
+      <p:grpSpPr>
+        <a:xfrm>
+          <a:off x="0" y="0"/>
+          <a:ext cx="0" cy="0"/>
+          <a:chOff x="0" y="0"/>
+          <a:chExt cx="0" cy="0"/>
+        </a:xfrm>
+      </p:grpSpPr>
+      <p:sp>
+        <p:nvSpPr>
+          <p:cNvPr id="3" name="TextBox 2">
+            <a:extLst>
+              <a:ext uri="{FF2B5EF4-FFF2-40B4-BE49-F238E27FC236}">
+                <a16:creationId xmlns:a16="http://schemas.microsoft.com/office/drawing/2014/main" id="{24D6F3BB-5608-9D49-9664-066B6362EE0E}"/>
+              </a:ext>
+            </a:extLst>
+          </p:cNvPr>
+          <p:cNvSpPr txBox="1"/>
+          <p:nvPr/>
+        </p:nvSpPr>
+        <p:spPr>
+          <a:xfrm>
+            <a:off x="308012" y="4354777"/>
+            <a:ext cx="7983581" cy="769441"/>
+          </a:xfrm>
+          <a:prstGeom prst="rect">
+            <a:avLst/>
+          </a:prstGeom>
+          <a:noFill/>
+        </p:spPr>
+        <p:txBody>
+          <a:bodyPr wrap="square" rtlCol="0">
+            <a:spAutoFit/>
+          </a:bodyPr>
+          <a:lstStyle/>
+          <a:p>
+            <a:r>
+              <a:rPr lang="en-US" sz="1100" b="1" dirty="0">
+                <a:latin typeface="Arial" charset="0"/>
+                <a:ea typeface="Arial" charset="0"/>
+                <a:cs typeface="Arial" charset="0"/>
+              </a:rPr>
+              <a:t>Supplemental Figure 3</a:t>
+            </a:r>
+            <a:r>
+              <a:rPr lang="en-US" sz="1100" dirty="0">
+                <a:latin typeface="Arial" charset="0"/>
+                <a:ea typeface="Arial" charset="0"/>
+                <a:cs typeface="Arial" charset="0"/>
+              </a:rPr>
+              <a:t>.</a:t>
+            </a:r>
+            <a:r>
+              <a:rPr lang="en-US" sz="1100" b="1" dirty="0">
+                <a:latin typeface="Arial" charset="0"/>
+                <a:ea typeface="Arial" charset="0"/>
+                <a:cs typeface="Arial" charset="0"/>
+              </a:rPr>
+              <a:t> Correlation between father’s age at conception and number of unphased indels per trio. </a:t>
+            </a:r>
+            <a:r>
+              <a:rPr lang="en-US" sz="1100" dirty="0">
+                <a:latin typeface="Arial" charset="0"/>
+                <a:ea typeface="Arial" charset="0"/>
+                <a:cs typeface="Arial" charset="0"/>
+              </a:rPr>
+              <a:t>Trios without phasing information reveal correlations consistent with a pronounced paternal age effect in both CCCs and non-CCCs, in contrast to phased </a:t>
+            </a:r>
+            <a:r>
+              <a:rPr lang="en-US" sz="1100" i="1" dirty="0">
+                <a:latin typeface="Arial" charset="0"/>
+                <a:ea typeface="Arial" charset="0"/>
+                <a:cs typeface="Arial" charset="0"/>
+              </a:rPr>
+              <a:t>de novo </a:t>
+            </a:r>
+            <a:r>
+              <a:rPr lang="en-US" sz="1100" dirty="0">
+                <a:latin typeface="Arial" charset="0"/>
+                <a:ea typeface="Arial" charset="0"/>
+                <a:cs typeface="Arial" charset="0"/>
+              </a:rPr>
+              <a:t>indels where only CCCs where significantly correlated. P-values were obtained from multiple regression coefficients and meta-analyzed with Fisher’s method.</a:t>
+            </a:r>
+          </a:p>
+        </p:txBody>
+      </p:sp>
+      <p:grpSp>
+        <p:nvGrpSpPr>
+          <p:cNvPr id="26" name="Group 25">
+            <a:extLst>
+              <a:ext uri="{FF2B5EF4-FFF2-40B4-BE49-F238E27FC236}">
+                <a16:creationId xmlns:a16="http://schemas.microsoft.com/office/drawing/2014/main" id="{DED8B1E2-D8B1-4C48-A15B-02B0343054C0}"/>
+              </a:ext>
+            </a:extLst>
+          </p:cNvPr>
+          <p:cNvGrpSpPr/>
+          <p:nvPr/>
+        </p:nvGrpSpPr>
+        <p:grpSpPr>
+          <a:xfrm>
+            <a:off x="322896" y="425413"/>
+            <a:ext cx="6041267" cy="3850149"/>
+            <a:chOff x="772346" y="425413"/>
+            <a:chExt cx="6041267" cy="3850149"/>
+          </a:xfrm>
+        </p:grpSpPr>
+        <p:sp>
+          <p:nvSpPr>
+            <p:cNvPr id="14" name="TextBox 13">
+              <a:extLst>
+                <a:ext uri="{FF2B5EF4-FFF2-40B4-BE49-F238E27FC236}">
+                  <a16:creationId xmlns:a16="http://schemas.microsoft.com/office/drawing/2014/main" id="{707F2261-7B80-854A-9C65-8CFB31DF0183}"/>
+                </a:ext>
+              </a:extLst>
+            </p:cNvPr>
+            <p:cNvSpPr txBox="1"/>
+            <p:nvPr/>
+          </p:nvSpPr>
+          <p:spPr>
+            <a:xfrm rot="16200000">
+              <a:off x="1502759" y="1884662"/>
+              <a:ext cx="1192936" cy="290324"/>
+            </a:xfrm>
+            <a:prstGeom prst="rect">
+              <a:avLst/>
+            </a:prstGeom>
+            <a:noFill/>
+          </p:spPr>
+          <p:txBody>
+            <a:bodyPr wrap="none" rtlCol="0">
+              <a:spAutoFit/>
+            </a:bodyPr>
+            <a:lstStyle/>
+            <a:p>
+              <a:r>
+                <a:rPr lang="en-US" dirty="0">
+                  <a:latin typeface="Arial" panose="020B0604020202020204" pitchFamily="34" charset="0"/>
+                  <a:cs typeface="Arial" panose="020B0604020202020204" pitchFamily="34" charset="0"/>
+                </a:rPr>
+                <a:t>Indels per trio</a:t>
+              </a:r>
+            </a:p>
+          </p:txBody>
+        </p:sp>
+        <p:sp>
+          <p:nvSpPr>
+            <p:cNvPr id="15" name="TextBox 14">
+              <a:extLst>
+                <a:ext uri="{FF2B5EF4-FFF2-40B4-BE49-F238E27FC236}">
+                  <a16:creationId xmlns:a16="http://schemas.microsoft.com/office/drawing/2014/main" id="{351C8DB2-93CC-B142-B435-249EAF0E647F}"/>
+                </a:ext>
+              </a:extLst>
+            </p:cNvPr>
+            <p:cNvSpPr txBox="1"/>
+            <p:nvPr/>
+          </p:nvSpPr>
+          <p:spPr>
+            <a:xfrm>
+              <a:off x="3268370" y="3998563"/>
+              <a:ext cx="2607259" cy="276999"/>
+            </a:xfrm>
+            <a:prstGeom prst="rect">
+              <a:avLst/>
+            </a:prstGeom>
+            <a:noFill/>
+          </p:spPr>
+          <p:txBody>
+            <a:bodyPr wrap="square" rtlCol="0">
+              <a:spAutoFit/>
+            </a:bodyPr>
+            <a:lstStyle/>
+            <a:p>
+              <a:pPr algn="ctr"/>
+              <a:r>
+                <a:rPr lang="en-US" sz="1200" dirty="0">
+                  <a:latin typeface="Arial" panose="020B0604020202020204" pitchFamily="34" charset="0"/>
+                  <a:cs typeface="Arial" panose="020B0604020202020204" pitchFamily="34" charset="0"/>
+                </a:rPr>
+                <a:t>Father’s age at conception</a:t>
+              </a:r>
+            </a:p>
+          </p:txBody>
+        </p:sp>
+        <p:sp>
+          <p:nvSpPr>
+            <p:cNvPr id="16" name="TextBox 15">
+              <a:extLst>
+                <a:ext uri="{FF2B5EF4-FFF2-40B4-BE49-F238E27FC236}">
+                  <a16:creationId xmlns:a16="http://schemas.microsoft.com/office/drawing/2014/main" id="{201B0EDC-48DF-0240-A77B-D79D2AA331C0}"/>
+                </a:ext>
+              </a:extLst>
+            </p:cNvPr>
+            <p:cNvSpPr txBox="1"/>
+            <p:nvPr/>
+          </p:nvSpPr>
+          <p:spPr>
+            <a:xfrm>
+              <a:off x="772346" y="880816"/>
+              <a:ext cx="914400" cy="461665"/>
+            </a:xfrm>
+            <a:prstGeom prst="rect">
+              <a:avLst/>
+            </a:prstGeom>
+            <a:noFill/>
+            <a:ln>
+              <a:solidFill>
+                <a:schemeClr val="tx1"/>
+              </a:solidFill>
+            </a:ln>
+          </p:spPr>
+          <p:txBody>
+            <a:bodyPr wrap="square" rtlCol="0" anchor="ctr">
+              <a:spAutoFit/>
+            </a:bodyPr>
+            <a:lstStyle/>
+            <a:p>
+              <a:pPr algn="ctr"/>
+              <a:r>
+                <a:rPr lang="en-US" sz="1200" b="1" dirty="0">
+                  <a:latin typeface="Arial" panose="020B0604020202020204" pitchFamily="34" charset="0"/>
+                  <a:cs typeface="Arial" panose="020B0604020202020204" pitchFamily="34" charset="0"/>
+                </a:rPr>
+                <a:t>PCGC</a:t>
+              </a:r>
+            </a:p>
+            <a:p>
+              <a:pPr algn="ctr"/>
+              <a:r>
+                <a:rPr lang="en-US" sz="1200" b="1" dirty="0">
+                  <a:latin typeface="Arial" panose="020B0604020202020204" pitchFamily="34" charset="0"/>
+                  <a:cs typeface="Arial" panose="020B0604020202020204" pitchFamily="34" charset="0"/>
+                </a:rPr>
+                <a:t>(n=441)</a:t>
+              </a:r>
+            </a:p>
+          </p:txBody>
+        </p:sp>
+        <p:sp>
+          <p:nvSpPr>
+            <p:cNvPr id="17" name="TextBox 16">
+              <a:extLst>
+                <a:ext uri="{FF2B5EF4-FFF2-40B4-BE49-F238E27FC236}">
+                  <a16:creationId xmlns:a16="http://schemas.microsoft.com/office/drawing/2014/main" id="{59B8B849-8B1C-4A42-8155-C6405AC77463}"/>
+                </a:ext>
+              </a:extLst>
+            </p:cNvPr>
+            <p:cNvSpPr txBox="1"/>
+            <p:nvPr/>
+          </p:nvSpPr>
+          <p:spPr>
+            <a:xfrm>
+              <a:off x="772346" y="2034064"/>
+              <a:ext cx="914400" cy="461665"/>
+            </a:xfrm>
+            <a:prstGeom prst="rect">
+              <a:avLst/>
+            </a:prstGeom>
+            <a:noFill/>
+            <a:ln>
+              <a:solidFill>
+                <a:schemeClr val="tx1"/>
+              </a:solidFill>
+            </a:ln>
+          </p:spPr>
+          <p:txBody>
+            <a:bodyPr wrap="square" rtlCol="0" anchor="ctr">
+              <a:spAutoFit/>
+            </a:bodyPr>
+            <a:lstStyle/>
+            <a:p>
+              <a:pPr algn="ctr"/>
+              <a:r>
+                <a:rPr lang="en-US" sz="1200" b="1" dirty="0">
+                  <a:latin typeface="Arial" panose="020B0604020202020204" pitchFamily="34" charset="0"/>
+                  <a:cs typeface="Arial" panose="020B0604020202020204" pitchFamily="34" charset="0"/>
+                </a:rPr>
+                <a:t>SFARI</a:t>
+              </a:r>
+            </a:p>
+            <a:p>
+              <a:pPr algn="ctr"/>
+              <a:r>
+                <a:rPr lang="en-US" sz="1200" b="1" dirty="0">
+                  <a:latin typeface="Arial" panose="020B0604020202020204" pitchFamily="34" charset="0"/>
+                  <a:cs typeface="Arial" panose="020B0604020202020204" pitchFamily="34" charset="0"/>
+                </a:rPr>
+                <a:t>(n=1,627)</a:t>
+              </a:r>
+            </a:p>
+          </p:txBody>
+        </p:sp>
+        <p:sp>
+          <p:nvSpPr>
+            <p:cNvPr id="18" name="TextBox 17">
+              <a:extLst>
+                <a:ext uri="{FF2B5EF4-FFF2-40B4-BE49-F238E27FC236}">
+                  <a16:creationId xmlns:a16="http://schemas.microsoft.com/office/drawing/2014/main" id="{383BFC13-B88B-5749-9A7E-CC2686D7F133}"/>
+                </a:ext>
+              </a:extLst>
+            </p:cNvPr>
+            <p:cNvSpPr txBox="1"/>
+            <p:nvPr/>
+          </p:nvSpPr>
+          <p:spPr>
+            <a:xfrm>
+              <a:off x="772346" y="3119293"/>
+              <a:ext cx="914400" cy="461665"/>
+            </a:xfrm>
+            <a:prstGeom prst="rect">
+              <a:avLst/>
+            </a:prstGeom>
+            <a:noFill/>
+            <a:ln>
+              <a:solidFill>
+                <a:schemeClr val="tx1"/>
+              </a:solidFill>
+            </a:ln>
+          </p:spPr>
+          <p:txBody>
+            <a:bodyPr wrap="square" rtlCol="0" anchor="ctr">
+              <a:spAutoFit/>
+            </a:bodyPr>
+            <a:lstStyle/>
+            <a:p>
+              <a:pPr algn="ctr"/>
+              <a:r>
+                <a:rPr lang="en-US" sz="1200" b="1" dirty="0">
+                  <a:latin typeface="Arial" panose="020B0604020202020204" pitchFamily="34" charset="0"/>
+                  <a:cs typeface="Arial" panose="020B0604020202020204" pitchFamily="34" charset="0"/>
+                </a:rPr>
+                <a:t>deCODE</a:t>
+              </a:r>
+            </a:p>
+            <a:p>
+              <a:pPr algn="ctr"/>
+              <a:r>
+                <a:rPr lang="en-US" sz="1200" b="1" dirty="0">
+                  <a:latin typeface="Arial" panose="020B0604020202020204" pitchFamily="34" charset="0"/>
+                  <a:cs typeface="Arial" panose="020B0604020202020204" pitchFamily="34" charset="0"/>
+                </a:rPr>
+                <a:t>(n=1,323)</a:t>
+              </a:r>
+            </a:p>
+          </p:txBody>
+        </p:sp>
+        <p:pic>
+          <p:nvPicPr>
+            <p:cNvPr id="20" name="Picture 19" descr="A screenshot of a cell phone&#13;&#10;&#13;&#10;Description automatically generated">
+              <a:extLst>
+                <a:ext uri="{FF2B5EF4-FFF2-40B4-BE49-F238E27FC236}">
+                  <a16:creationId xmlns:a16="http://schemas.microsoft.com/office/drawing/2014/main" id="{CD9753CA-E525-1543-87C0-107D411245AC}"/>
+                </a:ext>
+              </a:extLst>
+            </p:cNvPr>
+            <p:cNvPicPr>
+              <a:picLocks noChangeAspect="1"/>
+            </p:cNvPicPr>
+            <p:nvPr/>
+          </p:nvPicPr>
+          <p:blipFill rotWithShape="1">
+            <a:blip r:embed="rId2"/>
+            <a:srcRect l="4167" t="17811" b="11905"/>
+            <a:stretch/>
+          </p:blipFill>
+          <p:spPr>
+            <a:xfrm>
+              <a:off x="2294736" y="1849696"/>
+              <a:ext cx="4518875" cy="1104719"/>
+            </a:xfrm>
+            <a:prstGeom prst="rect">
+              <a:avLst/>
+            </a:prstGeom>
+          </p:spPr>
+        </p:pic>
+        <p:pic>
+          <p:nvPicPr>
+            <p:cNvPr id="22" name="Picture 21" descr="A screenshot of a cell phone&#13;&#10;&#13;&#10;Description automatically generated">
+              <a:extLst>
+                <a:ext uri="{FF2B5EF4-FFF2-40B4-BE49-F238E27FC236}">
+                  <a16:creationId xmlns:a16="http://schemas.microsoft.com/office/drawing/2014/main" id="{90D6AAF7-8B78-BC41-8AA2-EED557F4A735}"/>
+                </a:ext>
+              </a:extLst>
+            </p:cNvPr>
+            <p:cNvPicPr>
+              <a:picLocks noChangeAspect="1"/>
+            </p:cNvPicPr>
+            <p:nvPr/>
+          </p:nvPicPr>
+          <p:blipFill rotWithShape="1">
+            <a:blip r:embed="rId3"/>
+            <a:srcRect l="4167" b="11905"/>
+            <a:stretch/>
+          </p:blipFill>
+          <p:spPr>
+            <a:xfrm>
+              <a:off x="2294736" y="425413"/>
+              <a:ext cx="4518873" cy="1384676"/>
+            </a:xfrm>
+            <a:prstGeom prst="rect">
+              <a:avLst/>
+            </a:prstGeom>
+          </p:spPr>
+        </p:pic>
+        <p:pic>
+          <p:nvPicPr>
+            <p:cNvPr id="24" name="Picture 23" descr="A screenshot of a cell phone&#13;&#10;&#13;&#10;Description automatically generated">
+              <a:extLst>
+                <a:ext uri="{FF2B5EF4-FFF2-40B4-BE49-F238E27FC236}">
+                  <a16:creationId xmlns:a16="http://schemas.microsoft.com/office/drawing/2014/main" id="{BB547B5B-B607-914C-BFF9-7681E7B1A4DA}"/>
+                </a:ext>
+              </a:extLst>
+            </p:cNvPr>
+            <p:cNvPicPr>
+              <a:picLocks noChangeAspect="1"/>
+            </p:cNvPicPr>
+            <p:nvPr/>
+          </p:nvPicPr>
+          <p:blipFill rotWithShape="1">
+            <a:blip r:embed="rId4"/>
+            <a:srcRect l="4167" t="21016" b="11905"/>
+            <a:stretch/>
+          </p:blipFill>
+          <p:spPr>
+            <a:xfrm>
+              <a:off x="2294736" y="2917596"/>
+              <a:ext cx="4518877" cy="1054345"/>
+            </a:xfrm>
+            <a:prstGeom prst="rect">
+              <a:avLst/>
+            </a:prstGeom>
+          </p:spPr>
+        </p:pic>
+      </p:grpSp>
+      <p:graphicFrame>
+        <p:nvGraphicFramePr>
+          <p:cNvPr id="27" name="Table 26">
+            <a:extLst>
+              <a:ext uri="{FF2B5EF4-FFF2-40B4-BE49-F238E27FC236}">
+                <a16:creationId xmlns:a16="http://schemas.microsoft.com/office/drawing/2014/main" id="{235A0539-EC7D-DB49-B919-1D6E5A9534CA}"/>
+              </a:ext>
+            </a:extLst>
+          </p:cNvPr>
+          <p:cNvGraphicFramePr>
+            <a:graphicFrameLocks noGrp="1"/>
+          </p:cNvGraphicFramePr>
+          <p:nvPr>
+            <p:extLst>
+              <p:ext uri="{D42A27DB-BD31-4B8C-83A1-F6EECF244321}">
+                <p14:modId xmlns:p14="http://schemas.microsoft.com/office/powerpoint/2010/main" val="578238426"/>
+              </p:ext>
+            </p:extLst>
+          </p:nvPr>
+        </p:nvGraphicFramePr>
+        <p:xfrm>
+          <a:off x="6750051" y="1458079"/>
+          <a:ext cx="2125029" cy="1248226"/>
+        </p:xfrm>
+        <a:graphic>
+          <a:graphicData uri="http://schemas.openxmlformats.org/drawingml/2006/table">
+            <a:tbl>
+              <a:tblPr>
+                <a:tableStyleId>{793D81CF-94F2-401A-BA57-92F5A7B2D0C5}</a:tableStyleId>
+              </a:tblPr>
+              <a:tblGrid>
+                <a:gridCol w="768668">
+                  <a:extLst>
+                    <a:ext uri="{9D8B030D-6E8A-4147-A177-3AD203B41FA5}">
+                      <a16:colId xmlns:a16="http://schemas.microsoft.com/office/drawing/2014/main" val="1513444238"/>
+                    </a:ext>
+                  </a:extLst>
+                </a:gridCol>
+                <a:gridCol w="641668">
+                  <a:extLst>
+                    <a:ext uri="{9D8B030D-6E8A-4147-A177-3AD203B41FA5}">
+                      <a16:colId xmlns:a16="http://schemas.microsoft.com/office/drawing/2014/main" val="3705570056"/>
+                    </a:ext>
+                  </a:extLst>
+                </a:gridCol>
+                <a:gridCol w="714693">
+                  <a:extLst>
+                    <a:ext uri="{9D8B030D-6E8A-4147-A177-3AD203B41FA5}">
+                      <a16:colId xmlns:a16="http://schemas.microsoft.com/office/drawing/2014/main" val="2169457181"/>
+                    </a:ext>
+                  </a:extLst>
+                </a:gridCol>
+              </a:tblGrid>
+              <a:tr h="232509">
+                <a:tc>
+                  <a:txBody>
+                    <a:bodyPr/>
+                    <a:lstStyle/>
+                    <a:p>
+                      <a:pPr algn="ctr" fontAlgn="b"/>
+                      <a:endParaRPr lang="en-US" sz="1000" b="1" i="0" u="none" strike="noStrike" dirty="0">
+                        <a:solidFill>
+                          <a:srgbClr val="000000"/>
+                        </a:solidFill>
+                        <a:effectLst/>
+                        <a:latin typeface="Arial" panose="020B0604020202020204" pitchFamily="34" charset="0"/>
+                        <a:cs typeface="Arial" panose="020B0604020202020204" pitchFamily="34" charset="0"/>
+                      </a:endParaRPr>
+                    </a:p>
+                  </a:txBody>
+                  <a:tcPr anchor="ctr"/>
+                </a:tc>
+                <a:tc>
+                  <a:txBody>
+                    <a:bodyPr/>
+                    <a:lstStyle/>
+                    <a:p>
+                      <a:pPr algn="ctr" fontAlgn="b"/>
+                      <a:r>
+                        <a:rPr lang="en-US" sz="1000" b="1" u="none" strike="noStrike" dirty="0">
+                          <a:effectLst/>
+                          <a:latin typeface="Arial" panose="020B0604020202020204" pitchFamily="34" charset="0"/>
+                          <a:cs typeface="Arial" panose="020B0604020202020204" pitchFamily="34" charset="0"/>
+                        </a:rPr>
+                        <a:t>Mother</a:t>
+                      </a:r>
+                      <a:endParaRPr lang="en-US" sz="1000" b="1" i="0" u="none" strike="noStrike" dirty="0">
+                        <a:solidFill>
+                          <a:srgbClr val="000000"/>
+                        </a:solidFill>
+                        <a:effectLst/>
+                        <a:latin typeface="Arial" panose="020B0604020202020204" pitchFamily="34" charset="0"/>
+                        <a:cs typeface="Arial" panose="020B0604020202020204" pitchFamily="34" charset="0"/>
+                      </a:endParaRPr>
+                    </a:p>
+                  </a:txBody>
+                  <a:tcPr anchor="ctr"/>
+                </a:tc>
+                <a:tc>
+                  <a:txBody>
+                    <a:bodyPr/>
+                    <a:lstStyle/>
+                    <a:p>
+                      <a:pPr algn="ctr" fontAlgn="b"/>
+                      <a:r>
+                        <a:rPr lang="en-US" sz="1000" b="1" u="none" strike="noStrike" dirty="0">
+                          <a:effectLst/>
+                          <a:latin typeface="Arial" panose="020B0604020202020204" pitchFamily="34" charset="0"/>
+                          <a:cs typeface="Arial" panose="020B0604020202020204" pitchFamily="34" charset="0"/>
+                        </a:rPr>
+                        <a:t>Father</a:t>
+                      </a:r>
+                      <a:endParaRPr lang="en-US" sz="1000" b="1" i="0" u="none" strike="noStrike" dirty="0">
+                        <a:solidFill>
+                          <a:srgbClr val="000000"/>
+                        </a:solidFill>
+                        <a:effectLst/>
+                        <a:latin typeface="Arial" panose="020B0604020202020204" pitchFamily="34" charset="0"/>
+                        <a:cs typeface="Arial" panose="020B0604020202020204" pitchFamily="34" charset="0"/>
+                      </a:endParaRPr>
+                    </a:p>
+                  </a:txBody>
+                  <a:tcPr anchor="ctr"/>
+                </a:tc>
+                <a:extLst>
+                  <a:ext uri="{0D108BD9-81ED-4DB2-BD59-A6C34878D82A}">
+                    <a16:rowId xmlns:a16="http://schemas.microsoft.com/office/drawing/2014/main" val="3162047992"/>
+                  </a:ext>
+                </a:extLst>
+              </a:tr>
+              <a:tr h="220635">
+                <a:tc>
+                  <a:txBody>
+                    <a:bodyPr/>
+                    <a:lstStyle/>
+                    <a:p>
+                      <a:pPr algn="ctr" fontAlgn="b"/>
+                      <a:r>
+                        <a:rPr lang="en-US" sz="1000" b="1" i="0" u="none" strike="noStrike" dirty="0">
+                          <a:solidFill>
+                            <a:srgbClr val="000000"/>
+                          </a:solidFill>
+                          <a:effectLst/>
+                          <a:latin typeface="Arial" panose="020B0604020202020204" pitchFamily="34" charset="0"/>
+                          <a:cs typeface="Arial" panose="020B0604020202020204" pitchFamily="34" charset="0"/>
+                        </a:rPr>
+                        <a:t>HR</a:t>
+                      </a:r>
+                    </a:p>
+                  </a:txBody>
+                  <a:tcPr anchor="ctr">
+                    <a:lnR w="12700" cap="flat" cmpd="sng" algn="ctr">
+                      <a:noFill/>
+                      <a:prstDash val="solid"/>
+                      <a:round/>
+                      <a:headEnd type="none" w="med" len="med"/>
+                      <a:tailEnd type="none" w="med" len="med"/>
+                    </a:lnR>
+                    <a:lnB w="12700" cap="flat" cmpd="sng" algn="ctr">
+                      <a:noFill/>
+                      <a:prstDash val="solid"/>
+                      <a:round/>
+                      <a:headEnd type="none" w="med" len="med"/>
+                      <a:tailEnd type="none" w="med" len="med"/>
+                    </a:lnB>
+                  </a:tcPr>
+                </a:tc>
+                <a:tc>
+                  <a:txBody>
+                    <a:bodyPr/>
+                    <a:lstStyle/>
+                    <a:p>
+                      <a:pPr algn="ctr" fontAlgn="b"/>
+                      <a:r>
+                        <a:rPr lang="en-US" sz="1000" u="none" strike="noStrike" dirty="0">
+                          <a:effectLst/>
+                          <a:latin typeface="Arial" panose="020B0604020202020204" pitchFamily="34" charset="0"/>
+                          <a:cs typeface="Arial" panose="020B0604020202020204" pitchFamily="34" charset="0"/>
+                        </a:rPr>
+                        <a:t>0.11</a:t>
+                      </a:r>
+                      <a:endParaRPr lang="en-US" sz="1000" b="0" i="0" u="none" strike="noStrike" dirty="0">
+                        <a:solidFill>
+                          <a:srgbClr val="000000"/>
+                        </a:solidFill>
+                        <a:effectLst/>
+                        <a:latin typeface="Arial" panose="020B0604020202020204" pitchFamily="34" charset="0"/>
+                        <a:cs typeface="Arial" panose="020B0604020202020204" pitchFamily="34" charset="0"/>
+                      </a:endParaRPr>
+                    </a:p>
+                  </a:txBody>
+                  <a:tcPr anchor="ctr">
+                    <a:lnL w="12700" cap="flat" cmpd="sng" algn="ctr">
+                      <a:noFill/>
+                      <a:prstDash val="solid"/>
+                      <a:round/>
+                      <a:headEnd type="none" w="med" len="med"/>
+                      <a:tailEnd type="none" w="med" len="med"/>
+                    </a:lnL>
+                    <a:lnR w="12700" cap="flat" cmpd="sng" algn="ctr">
+                      <a:noFill/>
+                      <a:prstDash val="solid"/>
+                      <a:round/>
+                      <a:headEnd type="none" w="med" len="med"/>
+                      <a:tailEnd type="none" w="med" len="med"/>
+                    </a:lnR>
+                    <a:lnB w="12700" cap="flat" cmpd="sng" algn="ctr">
+                      <a:noFill/>
+                      <a:prstDash val="solid"/>
+                      <a:round/>
+                      <a:headEnd type="none" w="med" len="med"/>
+                      <a:tailEnd type="none" w="med" len="med"/>
+                    </a:lnB>
+                  </a:tcPr>
+                </a:tc>
+                <a:tc>
+                  <a:txBody>
+                    <a:bodyPr/>
+                    <a:lstStyle/>
+                    <a:p>
+                      <a:pPr algn="ctr" fontAlgn="b"/>
+                      <a:r>
+                        <a:rPr lang="en-US" sz="1000" u="none" strike="noStrike" dirty="0">
+                          <a:effectLst/>
+                          <a:latin typeface="Arial" panose="020B0604020202020204" pitchFamily="34" charset="0"/>
+                          <a:cs typeface="Arial" panose="020B0604020202020204" pitchFamily="34" charset="0"/>
+                        </a:rPr>
+                        <a:t>0.13</a:t>
+                      </a:r>
+                      <a:endParaRPr lang="en-US" sz="1000" b="0" i="0" u="none" strike="noStrike" dirty="0">
+                        <a:solidFill>
+                          <a:srgbClr val="000000"/>
+                        </a:solidFill>
+                        <a:effectLst/>
+                        <a:latin typeface="Arial" panose="020B0604020202020204" pitchFamily="34" charset="0"/>
+                        <a:cs typeface="Arial" panose="020B0604020202020204" pitchFamily="34" charset="0"/>
+                      </a:endParaRPr>
+                    </a:p>
+                  </a:txBody>
+                  <a:tcPr anchor="ctr">
+                    <a:lnL w="12700" cap="flat" cmpd="sng" algn="ctr">
+                      <a:noFill/>
+                      <a:prstDash val="solid"/>
+                      <a:round/>
+                      <a:headEnd type="none" w="med" len="med"/>
+                      <a:tailEnd type="none" w="med" len="med"/>
+                    </a:lnL>
+                    <a:lnB w="12700" cap="flat" cmpd="sng" algn="ctr">
+                      <a:noFill/>
+                      <a:prstDash val="solid"/>
+                      <a:round/>
+                      <a:headEnd type="none" w="med" len="med"/>
+                      <a:tailEnd type="none" w="med" len="med"/>
+                    </a:lnB>
+                  </a:tcPr>
+                </a:tc>
+                <a:extLst>
+                  <a:ext uri="{0D108BD9-81ED-4DB2-BD59-A6C34878D82A}">
+                    <a16:rowId xmlns:a16="http://schemas.microsoft.com/office/drawing/2014/main" val="2380607133"/>
+                  </a:ext>
+                </a:extLst>
+              </a:tr>
+              <a:tr h="272866">
+                <a:tc>
+                  <a:txBody>
+                    <a:bodyPr/>
+                    <a:lstStyle/>
+                    <a:p>
+                      <a:pPr algn="ctr" fontAlgn="b"/>
+                      <a:r>
+                        <a:rPr lang="en-US" sz="1000" b="1" i="0" u="none" strike="noStrike" dirty="0">
+                          <a:solidFill>
+                            <a:srgbClr val="000000"/>
+                          </a:solidFill>
+                          <a:effectLst/>
+                          <a:latin typeface="Arial" panose="020B0604020202020204" pitchFamily="34" charset="0"/>
+                          <a:cs typeface="Arial" panose="020B0604020202020204" pitchFamily="34" charset="0"/>
+                        </a:rPr>
+                        <a:t>CCC</a:t>
+                      </a:r>
+                    </a:p>
+                  </a:txBody>
+                  <a:tcPr anchor="ctr">
+                    <a:lnR w="12700" cap="flat" cmpd="sng" algn="ctr">
+                      <a:noFill/>
+                      <a:prstDash val="solid"/>
+                      <a:round/>
+                      <a:headEnd type="none" w="med" len="med"/>
+                      <a:tailEnd type="none" w="med" len="med"/>
+                    </a:lnR>
+                    <a:lnT w="12700" cap="flat" cmpd="sng" algn="ctr">
+                      <a:noFill/>
+                      <a:prstDash val="solid"/>
+                      <a:round/>
+                      <a:headEnd type="none" w="med" len="med"/>
+                      <a:tailEnd type="none" w="med" len="med"/>
+                    </a:lnT>
+                    <a:lnB w="12700" cap="flat" cmpd="sng" algn="ctr">
+                      <a:noFill/>
+                      <a:prstDash val="solid"/>
+                      <a:round/>
+                      <a:headEnd type="none" w="med" len="med"/>
+                      <a:tailEnd type="none" w="med" len="med"/>
+                    </a:lnB>
+                  </a:tcPr>
+                </a:tc>
+                <a:tc>
+                  <a:txBody>
+                    <a:bodyPr/>
+                    <a:lstStyle/>
+                    <a:p>
+                      <a:pPr algn="ctr" fontAlgn="b"/>
+                      <a:r>
+                        <a:rPr lang="en-US" sz="1000" b="0" i="0" u="none" strike="noStrike" dirty="0">
+                          <a:solidFill>
+                            <a:srgbClr val="000000"/>
+                          </a:solidFill>
+                          <a:effectLst/>
+                          <a:latin typeface="Arial" panose="020B0604020202020204" pitchFamily="34" charset="0"/>
+                          <a:cs typeface="Arial" panose="020B0604020202020204" pitchFamily="34" charset="0"/>
+                        </a:rPr>
+                        <a:t>0.78</a:t>
+                      </a:r>
+                    </a:p>
+                  </a:txBody>
+                  <a:tcPr anchor="ctr">
+                    <a:lnL w="12700" cap="flat" cmpd="sng" algn="ctr">
+                      <a:noFill/>
+                      <a:prstDash val="solid"/>
+                      <a:round/>
+                      <a:headEnd type="none" w="med" len="med"/>
+                      <a:tailEnd type="none" w="med" len="med"/>
+                    </a:lnL>
+                    <a:lnR w="12700" cap="flat" cmpd="sng" algn="ctr">
+                      <a:noFill/>
+                      <a:prstDash val="solid"/>
+                      <a:round/>
+                      <a:headEnd type="none" w="med" len="med"/>
+                      <a:tailEnd type="none" w="med" len="med"/>
+                    </a:lnR>
+                    <a:lnT w="12700" cap="flat" cmpd="sng" algn="ctr">
+                      <a:noFill/>
+                      <a:prstDash val="solid"/>
+                      <a:round/>
+                      <a:headEnd type="none" w="med" len="med"/>
+                      <a:tailEnd type="none" w="med" len="med"/>
+                    </a:lnT>
+                    <a:lnB w="12700" cap="flat" cmpd="sng" algn="ctr">
+                      <a:noFill/>
+                      <a:prstDash val="solid"/>
+                      <a:round/>
+                      <a:headEnd type="none" w="med" len="med"/>
+                      <a:tailEnd type="none" w="med" len="med"/>
+                    </a:lnB>
+                  </a:tcPr>
+                </a:tc>
+                <a:tc>
+                  <a:txBody>
+                    <a:bodyPr/>
+                    <a:lstStyle/>
+                    <a:p>
+                      <a:pPr algn="ctr" fontAlgn="b"/>
+                      <a:r>
+                        <a:rPr lang="en-US" sz="1000" b="1" u="none" strike="noStrike" dirty="0">
+                          <a:effectLst/>
+                          <a:latin typeface="Arial" panose="020B0604020202020204" pitchFamily="34" charset="0"/>
+                          <a:cs typeface="Arial" panose="020B0604020202020204" pitchFamily="34" charset="0"/>
+                        </a:rPr>
+                        <a:t>1.0x10</a:t>
+                      </a:r>
+                      <a:r>
+                        <a:rPr lang="en-US" sz="1000" b="1" u="none" strike="noStrike" baseline="30000" dirty="0">
+                          <a:effectLst/>
+                          <a:latin typeface="Arial" panose="020B0604020202020204" pitchFamily="34" charset="0"/>
+                          <a:cs typeface="Arial" panose="020B0604020202020204" pitchFamily="34" charset="0"/>
+                        </a:rPr>
+                        <a:t>-9</a:t>
+                      </a:r>
+                      <a:endParaRPr lang="en-US" sz="1000" b="1" i="0" u="none" strike="noStrike" baseline="30000" dirty="0">
+                        <a:solidFill>
+                          <a:srgbClr val="000000"/>
+                        </a:solidFill>
+                        <a:effectLst/>
+                        <a:latin typeface="Arial" panose="020B0604020202020204" pitchFamily="34" charset="0"/>
+                        <a:cs typeface="Arial" panose="020B0604020202020204" pitchFamily="34" charset="0"/>
+                      </a:endParaRPr>
+                    </a:p>
+                  </a:txBody>
+                  <a:tcPr anchor="ctr">
+                    <a:lnL w="12700" cap="flat" cmpd="sng" algn="ctr">
+                      <a:noFill/>
+                      <a:prstDash val="solid"/>
+                      <a:round/>
+                      <a:headEnd type="none" w="med" len="med"/>
+                      <a:tailEnd type="none" w="med" len="med"/>
+                    </a:lnL>
+                    <a:lnT w="12700" cap="flat" cmpd="sng" algn="ctr">
+                      <a:noFill/>
+                      <a:prstDash val="solid"/>
+                      <a:round/>
+                      <a:headEnd type="none" w="med" len="med"/>
+                      <a:tailEnd type="none" w="med" len="med"/>
+                    </a:lnT>
+                    <a:lnB w="12700" cap="flat" cmpd="sng" algn="ctr">
+                      <a:noFill/>
+                      <a:prstDash val="solid"/>
+                      <a:round/>
+                      <a:headEnd type="none" w="med" len="med"/>
+                      <a:tailEnd type="none" w="med" len="med"/>
+                    </a:lnB>
+                  </a:tcPr>
+                </a:tc>
+                <a:extLst>
+                  <a:ext uri="{0D108BD9-81ED-4DB2-BD59-A6C34878D82A}">
+                    <a16:rowId xmlns:a16="http://schemas.microsoft.com/office/drawing/2014/main" val="1101181944"/>
+                  </a:ext>
+                </a:extLst>
+              </a:tr>
+              <a:tr h="0">
+                <a:tc>
+                  <a:txBody>
+                    <a:bodyPr/>
+                    <a:lstStyle/>
+                    <a:p>
+                      <a:pPr algn="ctr" fontAlgn="b"/>
+                      <a:r>
+                        <a:rPr lang="en-US" sz="1000" b="1" i="0" u="none" strike="noStrike" dirty="0">
+                          <a:solidFill>
+                            <a:srgbClr val="000000"/>
+                          </a:solidFill>
+                          <a:effectLst/>
+                          <a:latin typeface="Arial" panose="020B0604020202020204" pitchFamily="34" charset="0"/>
+                          <a:cs typeface="Arial" panose="020B0604020202020204" pitchFamily="34" charset="0"/>
+                        </a:rPr>
+                        <a:t>Non-CCC</a:t>
+                      </a:r>
+                    </a:p>
+                  </a:txBody>
+                  <a:tcPr anchor="ctr">
+                    <a:lnR w="12700" cap="flat" cmpd="sng" algn="ctr">
+                      <a:noFill/>
+                      <a:prstDash val="solid"/>
+                      <a:round/>
+                      <a:headEnd type="none" w="med" len="med"/>
+                      <a:tailEnd type="none" w="med" len="med"/>
+                    </a:lnR>
+                    <a:lnT w="12700" cap="flat" cmpd="sng" algn="ctr">
+                      <a:noFill/>
+                      <a:prstDash val="solid"/>
+                      <a:round/>
+                      <a:headEnd type="none" w="med" len="med"/>
+                      <a:tailEnd type="none" w="med" len="med"/>
+                    </a:lnT>
+                  </a:tcPr>
+                </a:tc>
+                <a:tc>
+                  <a:txBody>
+                    <a:bodyPr/>
+                    <a:lstStyle/>
+                    <a:p>
+                      <a:pPr algn="ctr" fontAlgn="b"/>
+                      <a:r>
+                        <a:rPr lang="en-US" sz="1000" u="none" strike="noStrike" dirty="0">
+                          <a:effectLst/>
+                          <a:latin typeface="Arial" panose="020B0604020202020204" pitchFamily="34" charset="0"/>
+                          <a:cs typeface="Arial" panose="020B0604020202020204" pitchFamily="34" charset="0"/>
+                        </a:rPr>
+                        <a:t>0.27</a:t>
+                      </a:r>
+                      <a:endParaRPr lang="en-US" sz="1000" b="0" i="0" u="none" strike="noStrike" dirty="0">
+                        <a:solidFill>
+                          <a:srgbClr val="000000"/>
+                        </a:solidFill>
+                        <a:effectLst/>
+                        <a:latin typeface="Arial" panose="020B0604020202020204" pitchFamily="34" charset="0"/>
+                        <a:cs typeface="Arial" panose="020B0604020202020204" pitchFamily="34" charset="0"/>
+                      </a:endParaRPr>
+                    </a:p>
+                  </a:txBody>
+                  <a:tcPr anchor="ctr">
+                    <a:lnL w="12700" cap="flat" cmpd="sng" algn="ctr">
+                      <a:noFill/>
+                      <a:prstDash val="solid"/>
+                      <a:round/>
+                      <a:headEnd type="none" w="med" len="med"/>
+                      <a:tailEnd type="none" w="med" len="med"/>
+                    </a:lnL>
+                    <a:lnR w="12700" cap="flat" cmpd="sng" algn="ctr">
+                      <a:noFill/>
+                      <a:prstDash val="solid"/>
+                      <a:round/>
+                      <a:headEnd type="none" w="med" len="med"/>
+                      <a:tailEnd type="none" w="med" len="med"/>
+                    </a:lnR>
+                    <a:lnT w="12700" cap="flat" cmpd="sng" algn="ctr">
+                      <a:noFill/>
+                      <a:prstDash val="solid"/>
+                      <a:round/>
+                      <a:headEnd type="none" w="med" len="med"/>
+                      <a:tailEnd type="none" w="med" len="med"/>
+                    </a:lnT>
+                  </a:tcPr>
+                </a:tc>
+                <a:tc>
+                  <a:txBody>
+                    <a:bodyPr/>
+                    <a:lstStyle/>
+                    <a:p>
+                      <a:pPr algn="ctr" fontAlgn="b"/>
+                      <a:r>
+                        <a:rPr lang="en-US" sz="1000" b="1" u="none" strike="noStrike" dirty="0">
+                          <a:effectLst/>
+                          <a:latin typeface="Arial" panose="020B0604020202020204" pitchFamily="34" charset="0"/>
+                          <a:cs typeface="Arial" panose="020B0604020202020204" pitchFamily="34" charset="0"/>
+                        </a:rPr>
+                        <a:t>2.4x10</a:t>
+                      </a:r>
+                      <a:r>
+                        <a:rPr lang="en-US" sz="1000" b="1" u="none" strike="noStrike" baseline="30000" dirty="0">
+                          <a:effectLst/>
+                          <a:latin typeface="Arial" panose="020B0604020202020204" pitchFamily="34" charset="0"/>
+                          <a:cs typeface="Arial" panose="020B0604020202020204" pitchFamily="34" charset="0"/>
+                        </a:rPr>
+                        <a:t>-7</a:t>
+                      </a:r>
+                      <a:endParaRPr lang="en-US" sz="1000" b="0" i="0" u="none" strike="noStrike" dirty="0">
+                        <a:solidFill>
+                          <a:srgbClr val="000000"/>
+                        </a:solidFill>
+                        <a:effectLst/>
+                        <a:latin typeface="Arial" panose="020B0604020202020204" pitchFamily="34" charset="0"/>
+                        <a:cs typeface="Arial" panose="020B0604020202020204" pitchFamily="34" charset="0"/>
+                      </a:endParaRPr>
+                    </a:p>
+                  </a:txBody>
+                  <a:tcPr anchor="ctr">
+                    <a:lnL w="12700" cap="flat" cmpd="sng" algn="ctr">
+                      <a:noFill/>
+                      <a:prstDash val="solid"/>
+                      <a:round/>
+                      <a:headEnd type="none" w="med" len="med"/>
+                      <a:tailEnd type="none" w="med" len="med"/>
+                    </a:lnL>
+                    <a:lnT w="12700" cap="flat" cmpd="sng" algn="ctr">
+                      <a:noFill/>
+                      <a:prstDash val="solid"/>
+                      <a:round/>
+                      <a:headEnd type="none" w="med" len="med"/>
+                      <a:tailEnd type="none" w="med" len="med"/>
+                    </a:lnT>
+                  </a:tcPr>
+                </a:tc>
+                <a:extLst>
+                  <a:ext uri="{0D108BD9-81ED-4DB2-BD59-A6C34878D82A}">
+                    <a16:rowId xmlns:a16="http://schemas.microsoft.com/office/drawing/2014/main" val="1284594093"/>
+                  </a:ext>
+                </a:extLst>
+              </a:tr>
+              <a:tr h="0">
+                <a:tc>
+                  <a:txBody>
+                    <a:bodyPr/>
+                    <a:lstStyle/>
+                    <a:p>
+                      <a:pPr algn="ctr" fontAlgn="b"/>
+                      <a:r>
+                        <a:rPr lang="en-US" sz="1000" b="1" i="0" u="none" strike="noStrike" dirty="0">
+                          <a:solidFill>
+                            <a:srgbClr val="000000"/>
+                          </a:solidFill>
+                          <a:effectLst/>
+                          <a:latin typeface="Arial" panose="020B0604020202020204" pitchFamily="34" charset="0"/>
+                          <a:cs typeface="Arial" panose="020B0604020202020204" pitchFamily="34" charset="0"/>
+                        </a:rPr>
+                        <a:t>All</a:t>
+                      </a:r>
+                    </a:p>
+                  </a:txBody>
+                  <a:tcPr anchor="ctr"/>
+                </a:tc>
+                <a:tc>
+                  <a:txBody>
+                    <a:bodyPr/>
+                    <a:lstStyle/>
+                    <a:p>
+                      <a:pPr algn="ctr" fontAlgn="b"/>
+                      <a:r>
+                        <a:rPr lang="en-US" sz="1000" b="0" u="none" strike="noStrike" dirty="0">
+                          <a:effectLst/>
+                          <a:latin typeface="Arial" panose="020B0604020202020204" pitchFamily="34" charset="0"/>
+                          <a:cs typeface="Arial" panose="020B0604020202020204" pitchFamily="34" charset="0"/>
+                        </a:rPr>
+                        <a:t>0.11</a:t>
+                      </a:r>
+                      <a:endParaRPr lang="en-US" sz="1000" b="0" i="0" u="none" strike="noStrike" dirty="0">
+                        <a:solidFill>
+                          <a:srgbClr val="000000"/>
+                        </a:solidFill>
+                        <a:effectLst/>
+                        <a:latin typeface="Arial" panose="020B0604020202020204" pitchFamily="34" charset="0"/>
+                        <a:cs typeface="Arial" panose="020B0604020202020204" pitchFamily="34" charset="0"/>
+                      </a:endParaRPr>
+                    </a:p>
+                  </a:txBody>
+                  <a:tcPr anchor="ctr"/>
+                </a:tc>
+                <a:tc>
+                  <a:txBody>
+                    <a:bodyPr/>
+                    <a:lstStyle/>
+                    <a:p>
+                      <a:pPr algn="ctr" fontAlgn="b"/>
+                      <a:r>
+                        <a:rPr lang="en-US" sz="1000" b="1" u="none" strike="noStrike" dirty="0">
+                          <a:effectLst/>
+                          <a:latin typeface="Arial" panose="020B0604020202020204" pitchFamily="34" charset="0"/>
+                          <a:cs typeface="Arial" panose="020B0604020202020204" pitchFamily="34" charset="0"/>
+                        </a:rPr>
+                        <a:t>3.6x10</a:t>
+                      </a:r>
+                      <a:r>
+                        <a:rPr lang="en-US" sz="1000" b="1" u="none" strike="noStrike" baseline="30000" dirty="0">
+                          <a:effectLst/>
+                          <a:latin typeface="Arial" panose="020B0604020202020204" pitchFamily="34" charset="0"/>
+                          <a:cs typeface="Arial" panose="020B0604020202020204" pitchFamily="34" charset="0"/>
+                        </a:rPr>
+                        <a:t>-14</a:t>
+                      </a:r>
+                      <a:endParaRPr lang="en-US" sz="1000" b="1" i="0" u="none" strike="noStrike" baseline="30000" dirty="0">
+                        <a:solidFill>
+                          <a:srgbClr val="000000"/>
+                        </a:solidFill>
+                        <a:effectLst/>
+                        <a:latin typeface="Arial" panose="020B0604020202020204" pitchFamily="34" charset="0"/>
+                        <a:cs typeface="Arial" panose="020B0604020202020204" pitchFamily="34" charset="0"/>
+                      </a:endParaRPr>
+                    </a:p>
+                  </a:txBody>
+                  <a:tcPr anchor="ctr"/>
+                </a:tc>
+                <a:extLst>
+                  <a:ext uri="{0D108BD9-81ED-4DB2-BD59-A6C34878D82A}">
+                    <a16:rowId xmlns:a16="http://schemas.microsoft.com/office/drawing/2014/main" val="163749435"/>
+                  </a:ext>
+                </a:extLst>
+              </a:tr>
+            </a:tbl>
+          </a:graphicData>
+        </a:graphic>
+      </p:graphicFrame>
+      <p:sp>
+        <p:nvSpPr>
+          <p:cNvPr id="28" name="TextBox 27">
+            <a:extLst>
+              <a:ext uri="{FF2B5EF4-FFF2-40B4-BE49-F238E27FC236}">
+                <a16:creationId xmlns:a16="http://schemas.microsoft.com/office/drawing/2014/main" id="{CF67279F-3436-D84A-BE51-B9FDAF09FE70}"/>
+              </a:ext>
+            </a:extLst>
+          </p:cNvPr>
+          <p:cNvSpPr txBox="1"/>
+          <p:nvPr/>
+        </p:nvSpPr>
+        <p:spPr>
+          <a:xfrm>
+            <a:off x="6890970" y="1173431"/>
+            <a:ext cx="1789214" cy="276999"/>
+          </a:xfrm>
+          <a:prstGeom prst="rect">
+            <a:avLst/>
+          </a:prstGeom>
+          <a:noFill/>
+        </p:spPr>
+        <p:txBody>
+          <a:bodyPr wrap="square" rtlCol="0">
+            <a:spAutoFit/>
+          </a:bodyPr>
+          <a:lstStyle/>
+          <a:p>
+            <a:pPr algn="ctr"/>
+            <a:r>
+              <a:rPr lang="en-US" sz="1200" b="1" dirty="0">
+                <a:latin typeface="Arial" panose="020B0604020202020204" pitchFamily="34" charset="0"/>
+                <a:cs typeface="Arial" panose="020B0604020202020204" pitchFamily="34" charset="0"/>
+              </a:rPr>
+              <a:t>Meta-analysis </a:t>
+            </a:r>
+            <a:r>
+              <a:rPr lang="en-US" sz="1200" b="1" i="1" dirty="0">
+                <a:latin typeface="Arial" panose="020B0604020202020204" pitchFamily="34" charset="0"/>
+                <a:cs typeface="Arial" panose="020B0604020202020204" pitchFamily="34" charset="0"/>
+              </a:rPr>
+              <a:t>P</a:t>
+            </a:r>
+          </a:p>
+        </p:txBody>
+      </p:sp>
+    </p:spTree>
+    <p:extLst>
+      <p:ext uri="{BB962C8B-B14F-4D97-AF65-F5344CB8AC3E}">
+        <p14:creationId xmlns:p14="http://schemas.microsoft.com/office/powerpoint/2010/main" val="2295209591"/>
+      </p:ext>
+    </p:extLst>
+  </p:cSld>
+  <p:clrMapOvr>
+    <a:masterClrMapping/>
+  </p:clrMapOvr>
+</p:sld>
+</file>
+
+<file path=ppt/slides/slide7.xml><?xml version="1.0" encoding="utf-8"?>
+<p:sld xmlns:a="http://schemas.openxmlformats.org/drawingml/2006/main" xmlns:r="http://schemas.openxmlformats.org/officeDocument/2006/relationships" xmlns:p="http://schemas.openxmlformats.org/presentationml/2006/main">
+  <p:cSld>
+    <p:spTree>
+      <p:nvGrpSpPr>
+        <p:cNvPr id="1" name=""/>
+        <p:cNvGrpSpPr/>
+        <p:nvPr/>
+      </p:nvGrpSpPr>
+      <p:grpSpPr>
+        <a:xfrm>
+          <a:off x="0" y="0"/>
+          <a:ext cx="0" cy="0"/>
+          <a:chOff x="0" y="0"/>
+          <a:chExt cx="0" cy="0"/>
+        </a:xfrm>
+      </p:grpSpPr>
+      <p:sp>
+        <p:nvSpPr>
+          <p:cNvPr id="3" name="TextBox 2">
+            <a:extLst>
+              <a:ext uri="{FF2B5EF4-FFF2-40B4-BE49-F238E27FC236}">
+                <a16:creationId xmlns:a16="http://schemas.microsoft.com/office/drawing/2014/main" id="{24D6F3BB-5608-9D49-9664-066B6362EE0E}"/>
+              </a:ext>
+            </a:extLst>
+          </p:cNvPr>
+          <p:cNvSpPr txBox="1"/>
+          <p:nvPr/>
+        </p:nvSpPr>
+        <p:spPr>
+          <a:xfrm>
+            <a:off x="296937" y="4223288"/>
+            <a:ext cx="8583592" cy="769441"/>
+          </a:xfrm>
+          <a:prstGeom prst="rect">
+            <a:avLst/>
+          </a:prstGeom>
+          <a:noFill/>
+        </p:spPr>
+        <p:txBody>
+          <a:bodyPr wrap="square" rtlCol="0">
+            <a:spAutoFit/>
+          </a:bodyPr>
+          <a:lstStyle/>
+          <a:p>
+            <a:r>
+              <a:rPr lang="en-US" sz="1100" b="1" dirty="0">
+                <a:latin typeface="Arial" charset="0"/>
+                <a:ea typeface="Arial" charset="0"/>
+                <a:cs typeface="Arial" charset="0"/>
+              </a:rPr>
+              <a:t>Supplemental Figure 4</a:t>
+            </a:r>
+            <a:r>
+              <a:rPr lang="en-US" sz="1100" dirty="0">
+                <a:latin typeface="Arial" charset="0"/>
+                <a:ea typeface="Arial" charset="0"/>
+                <a:cs typeface="Arial" charset="0"/>
+              </a:rPr>
+              <a:t>.</a:t>
+            </a:r>
+            <a:r>
+              <a:rPr lang="en-US" sz="1100" b="1" dirty="0">
+                <a:latin typeface="Arial" charset="0"/>
+                <a:ea typeface="Arial" charset="0"/>
+                <a:cs typeface="Arial" charset="0"/>
+              </a:rPr>
+              <a:t> No association between number of </a:t>
+            </a:r>
+            <a:r>
+              <a:rPr lang="en-US" sz="1100" b="1" i="1" dirty="0">
+                <a:latin typeface="Arial" charset="0"/>
+                <a:ea typeface="Arial" charset="0"/>
+                <a:cs typeface="Arial" charset="0"/>
+              </a:rPr>
+              <a:t>de novo </a:t>
+            </a:r>
+            <a:r>
+              <a:rPr lang="en-US" sz="1100" b="1" dirty="0">
+                <a:latin typeface="Arial" charset="0"/>
+                <a:ea typeface="Arial" charset="0"/>
+                <a:cs typeface="Arial" charset="0"/>
+              </a:rPr>
+              <a:t>CCC indels and replication timing in embryonic stem cells. </a:t>
+            </a:r>
+            <a:r>
+              <a:rPr lang="en-US" sz="1100" dirty="0">
+                <a:latin typeface="Arial" charset="0"/>
+                <a:ea typeface="Arial" charset="0"/>
+                <a:cs typeface="Arial" charset="0"/>
+              </a:rPr>
+              <a:t>Parental ages were binned into quintiles and (1=youngest, 5=oldest). Within each bin, the fraction of </a:t>
+            </a:r>
+            <a:r>
+              <a:rPr lang="en-US" sz="1100" i="1" dirty="0">
+                <a:latin typeface="Arial" charset="0"/>
+                <a:ea typeface="Arial" charset="0"/>
+                <a:cs typeface="Arial" charset="0"/>
+              </a:rPr>
+              <a:t>de novo </a:t>
+            </a:r>
+            <a:r>
+              <a:rPr lang="en-US" sz="1100" dirty="0">
+                <a:latin typeface="Arial" charset="0"/>
+                <a:ea typeface="Arial" charset="0"/>
+                <a:cs typeface="Arial" charset="0"/>
+              </a:rPr>
+              <a:t>CCC indels falling in each of six replication time points (colors) was plotted. There was no increase in the fraction of </a:t>
+            </a:r>
+            <a:r>
+              <a:rPr lang="en-US" sz="1100" i="1" dirty="0">
+                <a:latin typeface="Arial" charset="0"/>
+                <a:ea typeface="Arial" charset="0"/>
+                <a:cs typeface="Arial" charset="0"/>
+              </a:rPr>
+              <a:t>de novo </a:t>
+            </a:r>
+            <a:r>
+              <a:rPr lang="en-US" sz="1100" dirty="0">
+                <a:latin typeface="Arial" charset="0"/>
+                <a:ea typeface="Arial" charset="0"/>
+                <a:cs typeface="Arial" charset="0"/>
+              </a:rPr>
+              <a:t>CCC indels in early-replicating regions (</a:t>
+            </a:r>
+            <a:r>
+              <a:rPr lang="en-US" sz="1100" i="1" dirty="0">
+                <a:latin typeface="Arial" charset="0"/>
+                <a:ea typeface="Arial" charset="0"/>
+                <a:cs typeface="Arial" charset="0"/>
+              </a:rPr>
+              <a:t>i.e.</a:t>
+            </a:r>
+            <a:r>
+              <a:rPr lang="en-US" sz="1100" dirty="0">
+                <a:latin typeface="Arial" charset="0"/>
+                <a:ea typeface="Arial" charset="0"/>
+                <a:cs typeface="Arial" charset="0"/>
+              </a:rPr>
+              <a:t>, G1b, S1) with increasing paternal age.</a:t>
+            </a:r>
+          </a:p>
+        </p:txBody>
+      </p:sp>
+      <p:pic>
+        <p:nvPicPr>
+          <p:cNvPr id="4" name="Picture 3" descr="A screenshot of a cell phone&#13;&#10;&#13;&#10;Description automatically generated">
+            <a:extLst>
+              <a:ext uri="{FF2B5EF4-FFF2-40B4-BE49-F238E27FC236}">
+                <a16:creationId xmlns:a16="http://schemas.microsoft.com/office/drawing/2014/main" id="{2D98E0BF-933A-764B-B6FE-F3F3D375913A}"/>
+              </a:ext>
+            </a:extLst>
+          </p:cNvPr>
+          <p:cNvPicPr>
+            <a:picLocks noChangeAspect="1"/>
+          </p:cNvPicPr>
+          <p:nvPr/>
+        </p:nvPicPr>
+        <p:blipFill>
+          <a:blip r:embed="rId2"/>
+          <a:stretch>
+            <a:fillRect/>
+          </a:stretch>
+        </p:blipFill>
+        <p:spPr>
+          <a:xfrm>
+            <a:off x="1109233" y="220514"/>
+            <a:ext cx="6600317" cy="3850185"/>
+          </a:xfrm>
+          <a:prstGeom prst="rect">
+            <a:avLst/>
+          </a:prstGeom>
+        </p:spPr>
+      </p:pic>
+    </p:spTree>
+    <p:extLst>
+      <p:ext uri="{BB962C8B-B14F-4D97-AF65-F5344CB8AC3E}">
+        <p14:creationId xmlns:p14="http://schemas.microsoft.com/office/powerpoint/2010/main" val="1860899885"/>
+      </p:ext>
+    </p:extLst>
+  </p:cSld>
+  <p:clrMapOvr>
+    <a:masterClrMapping/>
+  </p:clrMapOvr>
+</p:sld>
+</file>
+
 <file path=ppt/theme/theme1.xml><?xml version="1.0" encoding="utf-8"?>
 <a:theme xmlns:a="http://schemas.openxmlformats.org/drawingml/2006/main" name="Office Theme">
   <a:themeElements>

</xml_diff>

<commit_message>
updated manuscript w spearmans and 2ndary poisson mixed effects, instead of pearsons correlation
</commit_message>
<xml_diff>
--- a/manuscript/long_read_DNV_figures.pptx
+++ b/manuscript/long_read_DNV_figures.pptx
@@ -4,6 +4,9 @@
   <p:sldMasterIdLst>
     <p:sldMasterId id="2147483660" r:id="rId1"/>
   </p:sldMasterIdLst>
+  <p:notesMasterIdLst>
+    <p:notesMasterId r:id="rId9"/>
+  </p:notesMasterIdLst>
   <p:sldIdLst>
     <p:sldId id="316" r:id="rId2"/>
     <p:sldId id="325" r:id="rId3"/>
@@ -118,6 +121,439 @@
 </p:presentation>
 </file>
 
+<file path=ppt/notesMasters/notesMaster1.xml><?xml version="1.0" encoding="utf-8"?>
+<p:notesMaster xmlns:a="http://schemas.openxmlformats.org/drawingml/2006/main" xmlns:r="http://schemas.openxmlformats.org/officeDocument/2006/relationships" xmlns:p="http://schemas.openxmlformats.org/presentationml/2006/main">
+  <p:cSld>
+    <p:bg>
+      <p:bgRef idx="1001">
+        <a:schemeClr val="bg1"/>
+      </p:bgRef>
+    </p:bg>
+    <p:spTree>
+      <p:nvGrpSpPr>
+        <p:cNvPr id="1" name=""/>
+        <p:cNvGrpSpPr/>
+        <p:nvPr/>
+      </p:nvGrpSpPr>
+      <p:grpSpPr>
+        <a:xfrm>
+          <a:off x="0" y="0"/>
+          <a:ext cx="0" cy="0"/>
+          <a:chOff x="0" y="0"/>
+          <a:chExt cx="0" cy="0"/>
+        </a:xfrm>
+      </p:grpSpPr>
+      <p:sp>
+        <p:nvSpPr>
+          <p:cNvPr id="2" name="Header Placeholder 1"/>
+          <p:cNvSpPr>
+            <a:spLocks noGrp="1"/>
+          </p:cNvSpPr>
+          <p:nvPr>
+            <p:ph type="hdr" sz="quarter"/>
+          </p:nvPr>
+        </p:nvSpPr>
+        <p:spPr>
+          <a:xfrm>
+            <a:off x="0" y="0"/>
+            <a:ext cx="2971800" cy="458788"/>
+          </a:xfrm>
+          <a:prstGeom prst="rect">
+            <a:avLst/>
+          </a:prstGeom>
+        </p:spPr>
+        <p:txBody>
+          <a:bodyPr vert="horz" lIns="91440" tIns="45720" rIns="91440" bIns="45720" rtlCol="0"/>
+          <a:lstStyle>
+            <a:lvl1pPr algn="l">
+              <a:defRPr sz="1200"/>
+            </a:lvl1pPr>
+          </a:lstStyle>
+          <a:p>
+            <a:endParaRPr lang="en-US"/>
+          </a:p>
+        </p:txBody>
+      </p:sp>
+      <p:sp>
+        <p:nvSpPr>
+          <p:cNvPr id="3" name="Date Placeholder 2"/>
+          <p:cNvSpPr>
+            <a:spLocks noGrp="1"/>
+          </p:cNvSpPr>
+          <p:nvPr>
+            <p:ph type="dt" idx="1"/>
+          </p:nvPr>
+        </p:nvSpPr>
+        <p:spPr>
+          <a:xfrm>
+            <a:off x="3884613" y="0"/>
+            <a:ext cx="2971800" cy="458788"/>
+          </a:xfrm>
+          <a:prstGeom prst="rect">
+            <a:avLst/>
+          </a:prstGeom>
+        </p:spPr>
+        <p:txBody>
+          <a:bodyPr vert="horz" lIns="91440" tIns="45720" rIns="91440" bIns="45720" rtlCol="0"/>
+          <a:lstStyle>
+            <a:lvl1pPr algn="r">
+              <a:defRPr sz="1200"/>
+            </a:lvl1pPr>
+          </a:lstStyle>
+          <a:p>
+            <a:fld id="{0B5429DB-4822-944F-9D4B-3058A303F05E}" type="datetimeFigureOut">
+              <a:rPr lang="en-US" smtClean="0"/>
+              <a:t>3/18/19</a:t>
+            </a:fld>
+            <a:endParaRPr lang="en-US"/>
+          </a:p>
+        </p:txBody>
+      </p:sp>
+      <p:sp>
+        <p:nvSpPr>
+          <p:cNvPr id="4" name="Slide Image Placeholder 3"/>
+          <p:cNvSpPr>
+            <a:spLocks noGrp="1" noRot="1" noChangeAspect="1"/>
+          </p:cNvSpPr>
+          <p:nvPr>
+            <p:ph type="sldImg" idx="2"/>
+          </p:nvPr>
+        </p:nvSpPr>
+        <p:spPr>
+          <a:xfrm>
+            <a:off x="685800" y="1143000"/>
+            <a:ext cx="5486400" cy="3086100"/>
+          </a:xfrm>
+          <a:prstGeom prst="rect">
+            <a:avLst/>
+          </a:prstGeom>
+          <a:noFill/>
+          <a:ln w="12700">
+            <a:solidFill>
+              <a:prstClr val="black"/>
+            </a:solidFill>
+          </a:ln>
+        </p:spPr>
+        <p:txBody>
+          <a:bodyPr vert="horz" lIns="91440" tIns="45720" rIns="91440" bIns="45720" rtlCol="0" anchor="ctr"/>
+          <a:lstStyle/>
+          <a:p>
+            <a:endParaRPr lang="en-US"/>
+          </a:p>
+        </p:txBody>
+      </p:sp>
+      <p:sp>
+        <p:nvSpPr>
+          <p:cNvPr id="5" name="Notes Placeholder 4"/>
+          <p:cNvSpPr>
+            <a:spLocks noGrp="1"/>
+          </p:cNvSpPr>
+          <p:nvPr>
+            <p:ph type="body" sz="quarter" idx="3"/>
+          </p:nvPr>
+        </p:nvSpPr>
+        <p:spPr>
+          <a:xfrm>
+            <a:off x="685800" y="4400550"/>
+            <a:ext cx="5486400" cy="3600450"/>
+          </a:xfrm>
+          <a:prstGeom prst="rect">
+            <a:avLst/>
+          </a:prstGeom>
+        </p:spPr>
+        <p:txBody>
+          <a:bodyPr vert="horz" lIns="91440" tIns="45720" rIns="91440" bIns="45720" rtlCol="0"/>
+          <a:lstStyle/>
+          <a:p>
+            <a:pPr lvl="0"/>
+            <a:r>
+              <a:rPr lang="en-US"/>
+              <a:t>Click to edit Master text styles</a:t>
+            </a:r>
+          </a:p>
+          <a:p>
+            <a:pPr lvl="1"/>
+            <a:r>
+              <a:rPr lang="en-US"/>
+              <a:t>Second level</a:t>
+            </a:r>
+          </a:p>
+          <a:p>
+            <a:pPr lvl="2"/>
+            <a:r>
+              <a:rPr lang="en-US"/>
+              <a:t>Third level</a:t>
+            </a:r>
+          </a:p>
+          <a:p>
+            <a:pPr lvl="3"/>
+            <a:r>
+              <a:rPr lang="en-US"/>
+              <a:t>Fourth level</a:t>
+            </a:r>
+          </a:p>
+          <a:p>
+            <a:pPr lvl="4"/>
+            <a:r>
+              <a:rPr lang="en-US"/>
+              <a:t>Fifth level</a:t>
+            </a:r>
+          </a:p>
+        </p:txBody>
+      </p:sp>
+      <p:sp>
+        <p:nvSpPr>
+          <p:cNvPr id="6" name="Footer Placeholder 5"/>
+          <p:cNvSpPr>
+            <a:spLocks noGrp="1"/>
+          </p:cNvSpPr>
+          <p:nvPr>
+            <p:ph type="ftr" sz="quarter" idx="4"/>
+          </p:nvPr>
+        </p:nvSpPr>
+        <p:spPr>
+          <a:xfrm>
+            <a:off x="0" y="8685213"/>
+            <a:ext cx="2971800" cy="458787"/>
+          </a:xfrm>
+          <a:prstGeom prst="rect">
+            <a:avLst/>
+          </a:prstGeom>
+        </p:spPr>
+        <p:txBody>
+          <a:bodyPr vert="horz" lIns="91440" tIns="45720" rIns="91440" bIns="45720" rtlCol="0" anchor="b"/>
+          <a:lstStyle>
+            <a:lvl1pPr algn="l">
+              <a:defRPr sz="1200"/>
+            </a:lvl1pPr>
+          </a:lstStyle>
+          <a:p>
+            <a:endParaRPr lang="en-US"/>
+          </a:p>
+        </p:txBody>
+      </p:sp>
+      <p:sp>
+        <p:nvSpPr>
+          <p:cNvPr id="7" name="Slide Number Placeholder 6"/>
+          <p:cNvSpPr>
+            <a:spLocks noGrp="1"/>
+          </p:cNvSpPr>
+          <p:nvPr>
+            <p:ph type="sldNum" sz="quarter" idx="5"/>
+          </p:nvPr>
+        </p:nvSpPr>
+        <p:spPr>
+          <a:xfrm>
+            <a:off x="3884613" y="8685213"/>
+            <a:ext cx="2971800" cy="458787"/>
+          </a:xfrm>
+          <a:prstGeom prst="rect">
+            <a:avLst/>
+          </a:prstGeom>
+        </p:spPr>
+        <p:txBody>
+          <a:bodyPr vert="horz" lIns="91440" tIns="45720" rIns="91440" bIns="45720" rtlCol="0" anchor="b"/>
+          <a:lstStyle>
+            <a:lvl1pPr algn="r">
+              <a:defRPr sz="1200"/>
+            </a:lvl1pPr>
+          </a:lstStyle>
+          <a:p>
+            <a:fld id="{E91156FF-9516-074F-9B2E-802097BBB340}" type="slidenum">
+              <a:rPr lang="en-US" smtClean="0"/>
+              <a:t>‹#›</a:t>
+            </a:fld>
+            <a:endParaRPr lang="en-US"/>
+          </a:p>
+        </p:txBody>
+      </p:sp>
+    </p:spTree>
+    <p:extLst>
+      <p:ext uri="{BB962C8B-B14F-4D97-AF65-F5344CB8AC3E}">
+        <p14:creationId xmlns:p14="http://schemas.microsoft.com/office/powerpoint/2010/main" val="1121004384"/>
+      </p:ext>
+    </p:extLst>
+  </p:cSld>
+  <p:clrMap bg1="lt1" tx1="dk1" bg2="lt2" tx2="dk2" accent1="accent1" accent2="accent2" accent3="accent3" accent4="accent4" accent5="accent5" accent6="accent6" hlink="hlink" folHlink="folHlink"/>
+  <p:notesStyle>
+    <a:lvl1pPr marL="0" algn="l" defTabSz="914400" rtl="0" eaLnBrk="1" latinLnBrk="0" hangingPunct="1">
+      <a:defRPr sz="1200" kern="1200">
+        <a:solidFill>
+          <a:schemeClr val="tx1"/>
+        </a:solidFill>
+        <a:latin typeface="+mn-lt"/>
+        <a:ea typeface="+mn-ea"/>
+        <a:cs typeface="+mn-cs"/>
+      </a:defRPr>
+    </a:lvl1pPr>
+    <a:lvl2pPr marL="457200" algn="l" defTabSz="914400" rtl="0" eaLnBrk="1" latinLnBrk="0" hangingPunct="1">
+      <a:defRPr sz="1200" kern="1200">
+        <a:solidFill>
+          <a:schemeClr val="tx1"/>
+        </a:solidFill>
+        <a:latin typeface="+mn-lt"/>
+        <a:ea typeface="+mn-ea"/>
+        <a:cs typeface="+mn-cs"/>
+      </a:defRPr>
+    </a:lvl2pPr>
+    <a:lvl3pPr marL="914400" algn="l" defTabSz="914400" rtl="0" eaLnBrk="1" latinLnBrk="0" hangingPunct="1">
+      <a:defRPr sz="1200" kern="1200">
+        <a:solidFill>
+          <a:schemeClr val="tx1"/>
+        </a:solidFill>
+        <a:latin typeface="+mn-lt"/>
+        <a:ea typeface="+mn-ea"/>
+        <a:cs typeface="+mn-cs"/>
+      </a:defRPr>
+    </a:lvl3pPr>
+    <a:lvl4pPr marL="1371600" algn="l" defTabSz="914400" rtl="0" eaLnBrk="1" latinLnBrk="0" hangingPunct="1">
+      <a:defRPr sz="1200" kern="1200">
+        <a:solidFill>
+          <a:schemeClr val="tx1"/>
+        </a:solidFill>
+        <a:latin typeface="+mn-lt"/>
+        <a:ea typeface="+mn-ea"/>
+        <a:cs typeface="+mn-cs"/>
+      </a:defRPr>
+    </a:lvl4pPr>
+    <a:lvl5pPr marL="1828800" algn="l" defTabSz="914400" rtl="0" eaLnBrk="1" latinLnBrk="0" hangingPunct="1">
+      <a:defRPr sz="1200" kern="1200">
+        <a:solidFill>
+          <a:schemeClr val="tx1"/>
+        </a:solidFill>
+        <a:latin typeface="+mn-lt"/>
+        <a:ea typeface="+mn-ea"/>
+        <a:cs typeface="+mn-cs"/>
+      </a:defRPr>
+    </a:lvl5pPr>
+    <a:lvl6pPr marL="2286000" algn="l" defTabSz="914400" rtl="0" eaLnBrk="1" latinLnBrk="0" hangingPunct="1">
+      <a:defRPr sz="1200" kern="1200">
+        <a:solidFill>
+          <a:schemeClr val="tx1"/>
+        </a:solidFill>
+        <a:latin typeface="+mn-lt"/>
+        <a:ea typeface="+mn-ea"/>
+        <a:cs typeface="+mn-cs"/>
+      </a:defRPr>
+    </a:lvl6pPr>
+    <a:lvl7pPr marL="2743200" algn="l" defTabSz="914400" rtl="0" eaLnBrk="1" latinLnBrk="0" hangingPunct="1">
+      <a:defRPr sz="1200" kern="1200">
+        <a:solidFill>
+          <a:schemeClr val="tx1"/>
+        </a:solidFill>
+        <a:latin typeface="+mn-lt"/>
+        <a:ea typeface="+mn-ea"/>
+        <a:cs typeface="+mn-cs"/>
+      </a:defRPr>
+    </a:lvl7pPr>
+    <a:lvl8pPr marL="3200400" algn="l" defTabSz="914400" rtl="0" eaLnBrk="1" latinLnBrk="0" hangingPunct="1">
+      <a:defRPr sz="1200" kern="1200">
+        <a:solidFill>
+          <a:schemeClr val="tx1"/>
+        </a:solidFill>
+        <a:latin typeface="+mn-lt"/>
+        <a:ea typeface="+mn-ea"/>
+        <a:cs typeface="+mn-cs"/>
+      </a:defRPr>
+    </a:lvl8pPr>
+    <a:lvl9pPr marL="3657600" algn="l" defTabSz="914400" rtl="0" eaLnBrk="1" latinLnBrk="0" hangingPunct="1">
+      <a:defRPr sz="1200" kern="1200">
+        <a:solidFill>
+          <a:schemeClr val="tx1"/>
+        </a:solidFill>
+        <a:latin typeface="+mn-lt"/>
+        <a:ea typeface="+mn-ea"/>
+        <a:cs typeface="+mn-cs"/>
+      </a:defRPr>
+    </a:lvl9pPr>
+  </p:notesStyle>
+</p:notesMaster>
+</file>
+
+<file path=ppt/notesSlides/notesSlide1.xml><?xml version="1.0" encoding="utf-8"?>
+<p:notes xmlns:a="http://schemas.openxmlformats.org/drawingml/2006/main" xmlns:r="http://schemas.openxmlformats.org/officeDocument/2006/relationships" xmlns:p="http://schemas.openxmlformats.org/presentationml/2006/main">
+  <p:cSld>
+    <p:spTree>
+      <p:nvGrpSpPr>
+        <p:cNvPr id="1" name=""/>
+        <p:cNvGrpSpPr/>
+        <p:nvPr/>
+      </p:nvGrpSpPr>
+      <p:grpSpPr>
+        <a:xfrm>
+          <a:off x="0" y="0"/>
+          <a:ext cx="0" cy="0"/>
+          <a:chOff x="0" y="0"/>
+          <a:chExt cx="0" cy="0"/>
+        </a:xfrm>
+      </p:grpSpPr>
+      <p:sp>
+        <p:nvSpPr>
+          <p:cNvPr id="2" name="Slide Image Placeholder 1"/>
+          <p:cNvSpPr>
+            <a:spLocks noGrp="1" noRot="1" noChangeAspect="1"/>
+          </p:cNvSpPr>
+          <p:nvPr>
+            <p:ph type="sldImg"/>
+          </p:nvPr>
+        </p:nvSpPr>
+        <p:spPr/>
+      </p:sp>
+      <p:sp>
+        <p:nvSpPr>
+          <p:cNvPr id="3" name="Notes Placeholder 2"/>
+          <p:cNvSpPr>
+            <a:spLocks noGrp="1"/>
+          </p:cNvSpPr>
+          <p:nvPr>
+            <p:ph type="body" idx="1"/>
+          </p:nvPr>
+        </p:nvSpPr>
+        <p:spPr/>
+        <p:txBody>
+          <a:bodyPr/>
+          <a:lstStyle/>
+          <a:p>
+            <a:endParaRPr lang="en-US" dirty="0"/>
+          </a:p>
+        </p:txBody>
+      </p:sp>
+      <p:sp>
+        <p:nvSpPr>
+          <p:cNvPr id="4" name="Slide Number Placeholder 3"/>
+          <p:cNvSpPr>
+            <a:spLocks noGrp="1"/>
+          </p:cNvSpPr>
+          <p:nvPr>
+            <p:ph type="sldNum" sz="quarter" idx="5"/>
+          </p:nvPr>
+        </p:nvSpPr>
+        <p:spPr/>
+        <p:txBody>
+          <a:bodyPr/>
+          <a:lstStyle/>
+          <a:p>
+            <a:fld id="{E91156FF-9516-074F-9B2E-802097BBB340}" type="slidenum">
+              <a:rPr lang="en-US" smtClean="0"/>
+              <a:t>2</a:t>
+            </a:fld>
+            <a:endParaRPr lang="en-US"/>
+          </a:p>
+        </p:txBody>
+      </p:sp>
+    </p:spTree>
+    <p:extLst>
+      <p:ext uri="{BB962C8B-B14F-4D97-AF65-F5344CB8AC3E}">
+        <p14:creationId xmlns:p14="http://schemas.microsoft.com/office/powerpoint/2010/main" val="2948155379"/>
+      </p:ext>
+    </p:extLst>
+  </p:cSld>
+  <p:clrMapOvr>
+    <a:masterClrMapping/>
+  </p:clrMapOvr>
+</p:notes>
+</file>
+
 <file path=ppt/slideLayouts/slideLayout1.xml><?xml version="1.0" encoding="utf-8"?>
 <p:sldLayout xmlns:a="http://schemas.openxmlformats.org/drawingml/2006/main" xmlns:r="http://schemas.openxmlformats.org/officeDocument/2006/relationships" xmlns:p="http://schemas.openxmlformats.org/presentationml/2006/main" type="title" preserve="1">
   <p:cSld name="Title Slide">
@@ -249,7 +685,7 @@
           <a:p>
             <a:fld id="{91125946-127D-464D-9662-C3A399AB15E3}" type="datetimeFigureOut">
               <a:rPr lang="en-US" smtClean="0"/>
-              <a:t>2/8/19</a:t>
+              <a:t>3/18/19</a:t>
             </a:fld>
             <a:endParaRPr lang="en-US"/>
           </a:p>
@@ -419,7 +855,7 @@
           <a:p>
             <a:fld id="{91125946-127D-464D-9662-C3A399AB15E3}" type="datetimeFigureOut">
               <a:rPr lang="en-US" smtClean="0"/>
-              <a:t>2/8/19</a:t>
+              <a:t>3/18/19</a:t>
             </a:fld>
             <a:endParaRPr lang="en-US"/>
           </a:p>
@@ -599,7 +1035,7 @@
           <a:p>
             <a:fld id="{91125946-127D-464D-9662-C3A399AB15E3}" type="datetimeFigureOut">
               <a:rPr lang="en-US" smtClean="0"/>
-              <a:t>2/8/19</a:t>
+              <a:t>3/18/19</a:t>
             </a:fld>
             <a:endParaRPr lang="en-US"/>
           </a:p>
@@ -769,7 +1205,7 @@
           <a:p>
             <a:fld id="{91125946-127D-464D-9662-C3A399AB15E3}" type="datetimeFigureOut">
               <a:rPr lang="en-US" smtClean="0"/>
-              <a:t>2/8/19</a:t>
+              <a:t>3/18/19</a:t>
             </a:fld>
             <a:endParaRPr lang="en-US"/>
           </a:p>
@@ -1015,7 +1451,7 @@
           <a:p>
             <a:fld id="{91125946-127D-464D-9662-C3A399AB15E3}" type="datetimeFigureOut">
               <a:rPr lang="en-US" smtClean="0"/>
-              <a:t>2/8/19</a:t>
+              <a:t>3/18/19</a:t>
             </a:fld>
             <a:endParaRPr lang="en-US"/>
           </a:p>
@@ -1247,7 +1683,7 @@
           <a:p>
             <a:fld id="{91125946-127D-464D-9662-C3A399AB15E3}" type="datetimeFigureOut">
               <a:rPr lang="en-US" smtClean="0"/>
-              <a:t>2/8/19</a:t>
+              <a:t>3/18/19</a:t>
             </a:fld>
             <a:endParaRPr lang="en-US"/>
           </a:p>
@@ -1614,7 +2050,7 @@
           <a:p>
             <a:fld id="{91125946-127D-464D-9662-C3A399AB15E3}" type="datetimeFigureOut">
               <a:rPr lang="en-US" smtClean="0"/>
-              <a:t>2/8/19</a:t>
+              <a:t>3/18/19</a:t>
             </a:fld>
             <a:endParaRPr lang="en-US"/>
           </a:p>
@@ -1732,7 +2168,7 @@
           <a:p>
             <a:fld id="{91125946-127D-464D-9662-C3A399AB15E3}" type="datetimeFigureOut">
               <a:rPr lang="en-US" smtClean="0"/>
-              <a:t>2/8/19</a:t>
+              <a:t>3/18/19</a:t>
             </a:fld>
             <a:endParaRPr lang="en-US"/>
           </a:p>
@@ -1827,7 +2263,7 @@
           <a:p>
             <a:fld id="{91125946-127D-464D-9662-C3A399AB15E3}" type="datetimeFigureOut">
               <a:rPr lang="en-US" smtClean="0"/>
-              <a:t>2/8/19</a:t>
+              <a:t>3/18/19</a:t>
             </a:fld>
             <a:endParaRPr lang="en-US"/>
           </a:p>
@@ -2104,7 +2540,7 @@
           <a:p>
             <a:fld id="{91125946-127D-464D-9662-C3A399AB15E3}" type="datetimeFigureOut">
               <a:rPr lang="en-US" smtClean="0"/>
-              <a:t>2/8/19</a:t>
+              <a:t>3/18/19</a:t>
             </a:fld>
             <a:endParaRPr lang="en-US"/>
           </a:p>
@@ -2361,7 +2797,7 @@
           <a:p>
             <a:fld id="{91125946-127D-464D-9662-C3A399AB15E3}" type="datetimeFigureOut">
               <a:rPr lang="en-US" smtClean="0"/>
-              <a:t>2/8/19</a:t>
+              <a:t>3/18/19</a:t>
             </a:fld>
             <a:endParaRPr lang="en-US"/>
           </a:p>
@@ -2576,7 +3012,7 @@
             <a:fld id="{91125946-127D-464D-9662-C3A399AB15E3}" type="datetimeFigureOut">
               <a:rPr lang="en-US" smtClean="0"/>
               <a:pPr/>
-              <a:t>2/8/19</a:t>
+              <a:t>3/18/19</a:t>
             </a:fld>
             <a:endParaRPr lang="en-US" dirty="0"/>
           </a:p>
@@ -4403,10 +4839,138 @@
       </p:grpSpPr>
       <p:grpSp>
         <p:nvGrpSpPr>
-          <p:cNvPr id="39" name="Group 38">
+          <p:cNvPr id="14" name="Group 13">
             <a:extLst>
               <a:ext uri="{FF2B5EF4-FFF2-40B4-BE49-F238E27FC236}">
-                <a16:creationId xmlns:a16="http://schemas.microsoft.com/office/drawing/2014/main" id="{7B420B54-9C4F-E64A-8354-D996F02B78A7}"/>
+                <a16:creationId xmlns:a16="http://schemas.microsoft.com/office/drawing/2014/main" id="{5463F211-1D10-6F41-B583-4F6F5E199842}"/>
+              </a:ext>
+            </a:extLst>
+          </p:cNvPr>
+          <p:cNvGrpSpPr/>
+          <p:nvPr/>
+        </p:nvGrpSpPr>
+        <p:grpSpPr>
+          <a:xfrm>
+            <a:off x="3070083" y="2224526"/>
+            <a:ext cx="3606221" cy="1740508"/>
+            <a:chOff x="3109657" y="2213418"/>
+            <a:chExt cx="3606221" cy="1740508"/>
+          </a:xfrm>
+        </p:grpSpPr>
+        <p:pic>
+          <p:nvPicPr>
+            <p:cNvPr id="13" name="Picture 12">
+              <a:extLst>
+                <a:ext uri="{FF2B5EF4-FFF2-40B4-BE49-F238E27FC236}">
+                  <a16:creationId xmlns:a16="http://schemas.microsoft.com/office/drawing/2014/main" id="{E9145D43-F173-C14F-8C59-4F9B2B601AD0}"/>
+                </a:ext>
+              </a:extLst>
+            </p:cNvPr>
+            <p:cNvPicPr>
+              <a:picLocks noChangeAspect="1"/>
+            </p:cNvPicPr>
+            <p:nvPr/>
+          </p:nvPicPr>
+          <p:blipFill rotWithShape="1">
+            <a:blip r:embed="rId3"/>
+            <a:srcRect l="4397" r="18300" b="11672"/>
+            <a:stretch/>
+          </p:blipFill>
+          <p:spPr>
+            <a:xfrm>
+              <a:off x="3369711" y="2213418"/>
+              <a:ext cx="3346167" cy="1529359"/>
+            </a:xfrm>
+            <a:prstGeom prst="rect">
+              <a:avLst/>
+            </a:prstGeom>
+          </p:spPr>
+        </p:pic>
+        <p:sp>
+          <p:nvSpPr>
+            <p:cNvPr id="27" name="TextBox 26">
+              <a:extLst>
+                <a:ext uri="{FF2B5EF4-FFF2-40B4-BE49-F238E27FC236}">
+                  <a16:creationId xmlns:a16="http://schemas.microsoft.com/office/drawing/2014/main" id="{16529A30-DA5A-EE44-86EB-8FB03C6FF64A}"/>
+                </a:ext>
+              </a:extLst>
+            </p:cNvPr>
+            <p:cNvSpPr txBox="1"/>
+            <p:nvPr/>
+          </p:nvSpPr>
+          <p:spPr>
+            <a:xfrm>
+              <a:off x="3910119" y="3685825"/>
+              <a:ext cx="2608316" cy="268101"/>
+            </a:xfrm>
+            <a:prstGeom prst="rect">
+              <a:avLst/>
+            </a:prstGeom>
+            <a:noFill/>
+          </p:spPr>
+          <p:txBody>
+            <a:bodyPr wrap="square" rtlCol="0">
+              <a:spAutoFit/>
+            </a:bodyPr>
+            <a:lstStyle/>
+            <a:p>
+              <a:pPr algn="ctr"/>
+              <a:r>
+                <a:rPr lang="en-US" sz="1200" dirty="0">
+                  <a:latin typeface="Arial" panose="020B0604020202020204" pitchFamily="34" charset="0"/>
+                  <a:cs typeface="Arial" panose="020B0604020202020204" pitchFamily="34" charset="0"/>
+                </a:rPr>
+                <a:t>Parental age at conception</a:t>
+              </a:r>
+            </a:p>
+          </p:txBody>
+        </p:sp>
+        <p:sp>
+          <p:nvSpPr>
+            <p:cNvPr id="28" name="TextBox 27">
+              <a:extLst>
+                <a:ext uri="{FF2B5EF4-FFF2-40B4-BE49-F238E27FC236}">
+                  <a16:creationId xmlns:a16="http://schemas.microsoft.com/office/drawing/2014/main" id="{51064FA0-2BB1-2549-BEAF-83FFE7AD512A}"/>
+                </a:ext>
+              </a:extLst>
+            </p:cNvPr>
+            <p:cNvSpPr txBox="1"/>
+            <p:nvPr/>
+          </p:nvSpPr>
+          <p:spPr>
+            <a:xfrm rot="16200000">
+              <a:off x="2596901" y="2970762"/>
+              <a:ext cx="1293613" cy="268101"/>
+            </a:xfrm>
+            <a:prstGeom prst="rect">
+              <a:avLst/>
+            </a:prstGeom>
+            <a:noFill/>
+          </p:spPr>
+          <p:txBody>
+            <a:bodyPr wrap="square" rtlCol="0">
+              <a:spAutoFit/>
+            </a:bodyPr>
+            <a:lstStyle/>
+            <a:p>
+              <a:pPr algn="ctr"/>
+              <a:r>
+                <a:rPr lang="en-US" sz="1200" dirty="0">
+                  <a:latin typeface="Arial" panose="020B0604020202020204" pitchFamily="34" charset="0"/>
+                  <a:cs typeface="Arial" panose="020B0604020202020204" pitchFamily="34" charset="0"/>
+                </a:rPr>
+                <a:t>CCC indels/trio</a:t>
+              </a:r>
+            </a:p>
+          </p:txBody>
+        </p:sp>
+      </p:grpSp>
+      <p:grpSp>
+        <p:nvGrpSpPr>
+          <p:cNvPr id="7" name="Group 6">
+            <a:extLst>
+              <a:ext uri="{FF2B5EF4-FFF2-40B4-BE49-F238E27FC236}">
+                <a16:creationId xmlns:a16="http://schemas.microsoft.com/office/drawing/2014/main" id="{9D844724-A4D6-4540-B0C9-224617402CA1}"/>
               </a:ext>
             </a:extLst>
           </p:cNvPr>
@@ -4417,18 +4981,18 @@
         </p:nvGrpSpPr>
         <p:grpSpPr>
           <a:xfrm>
-            <a:off x="274146" y="2311335"/>
-            <a:ext cx="4115667" cy="1667013"/>
-            <a:chOff x="123986" y="2170923"/>
-            <a:chExt cx="4479292" cy="1814297"/>
+            <a:off x="578399" y="148186"/>
+            <a:ext cx="4971904" cy="2033929"/>
+            <a:chOff x="866722" y="189849"/>
+            <a:chExt cx="4048970" cy="1656371"/>
           </a:xfrm>
         </p:grpSpPr>
         <p:pic>
           <p:nvPicPr>
-            <p:cNvPr id="38" name="Picture 37" descr="A screenshot of a cell phone&#13;&#10;&#13;&#10;Description automatically generated">
+            <p:cNvPr id="4" name="Picture 3">
               <a:extLst>
                 <a:ext uri="{FF2B5EF4-FFF2-40B4-BE49-F238E27FC236}">
-                  <a16:creationId xmlns:a16="http://schemas.microsoft.com/office/drawing/2014/main" id="{BFB62228-B770-324A-9C7E-8E0A4088ED32}"/>
+                  <a16:creationId xmlns:a16="http://schemas.microsoft.com/office/drawing/2014/main" id="{30E7E8A2-05C7-7E45-BA1F-60F97A92358D}"/>
                 </a:ext>
               </a:extLst>
             </p:cNvPr>
@@ -4438,14 +5002,14 @@
             <p:nvPr/>
           </p:nvPicPr>
           <p:blipFill rotWithShape="1">
-            <a:blip r:embed="rId2"/>
-            <a:srcRect l="3983" r="16616" b="12102"/>
+            <a:blip r:embed="rId4"/>
+            <a:srcRect l="3491" r="15275" b="9798"/>
             <a:stretch/>
           </p:blipFill>
           <p:spPr>
             <a:xfrm>
-              <a:off x="123986" y="2170923"/>
-              <a:ext cx="4479292" cy="1577725"/>
+              <a:off x="866722" y="189849"/>
+              <a:ext cx="4048970" cy="1458687"/>
             </a:xfrm>
             <a:prstGeom prst="rect">
               <a:avLst/>
@@ -4466,8 +5030,8 @@
           </p:nvSpPr>
           <p:spPr>
             <a:xfrm>
-              <a:off x="1318623" y="3683748"/>
-              <a:ext cx="2760817" cy="301472"/>
+              <a:off x="1902047" y="1569221"/>
+              <a:ext cx="2536696" cy="276999"/>
             </a:xfrm>
             <a:prstGeom prst="rect">
               <a:avLst/>
@@ -4486,7 +5050,7 @@
                   <a:latin typeface="Arial" panose="020B0604020202020204" pitchFamily="34" charset="0"/>
                   <a:cs typeface="Arial" panose="020B0604020202020204" pitchFamily="34" charset="0"/>
                 </a:rPr>
-                <a:t>Pearson’s correlation coefficient</a:t>
+                <a:t>Spearman’s correlation coefficient</a:t>
               </a:r>
             </a:p>
           </p:txBody>
@@ -4506,8 +5070,8 @@
         </p:nvSpPr>
         <p:spPr>
           <a:xfrm>
-            <a:off x="54243" y="3973632"/>
-            <a:ext cx="7369445" cy="1107996"/>
+            <a:off x="54243" y="4007314"/>
+            <a:ext cx="8077386" cy="1107996"/>
           </a:xfrm>
           <a:prstGeom prst="rect">
             <a:avLst/>
@@ -4534,23 +5098,7 @@
                 <a:ea typeface="Arial" charset="0"/>
                 <a:cs typeface="Arial" charset="0"/>
               </a:rPr>
-              <a:t>Scatter plots illustrating the correlation between age at conception and the number of CCC indels (</a:t>
-            </a:r>
-            <a:r>
-              <a:rPr lang="en-US" sz="1100" b="1" dirty="0">
-                <a:latin typeface="Arial" charset="0"/>
-                <a:ea typeface="Arial" charset="0"/>
-                <a:cs typeface="Arial" charset="0"/>
-              </a:rPr>
-              <a:t>Supplemental Figure 1 </a:t>
-            </a:r>
-            <a:r>
-              <a:rPr lang="en-US" sz="1100" dirty="0">
-                <a:latin typeface="Arial" charset="0"/>
-                <a:ea typeface="Arial" charset="0"/>
-                <a:cs typeface="Arial" charset="0"/>
-              </a:rPr>
-              <a:t>for HR, non-CCC, and all indel scatter plots). </a:t>
+              <a:t>Spearman’s correlation coefficient and 95% confidence intervals between maternal or paternal age at conception and three indel classes for three methods. </a:t>
             </a:r>
             <a:r>
               <a:rPr lang="en-US" sz="1100" b="1" dirty="0">
@@ -4566,7 +5114,7 @@
                 <a:ea typeface="Arial" charset="0"/>
                 <a:cs typeface="Arial" charset="0"/>
               </a:rPr>
-              <a:t>Pearson’s correlation coefficient and 95% confidence intervals between maternal or paternal age at conception and three indel classes for three methods. </a:t>
+              <a:t>Fisher’s method meta-analysis of correlation p-values shows a significant correlation between paternal age and CCC indels. </a:t>
             </a:r>
             <a:r>
               <a:rPr lang="en-US" sz="1100" b="1" dirty="0">
@@ -4582,46 +5130,23 @@
                 <a:ea typeface="Arial" charset="0"/>
                 <a:cs typeface="Arial" charset="0"/>
               </a:rPr>
-              <a:t>Fisher’s method meta-analysis of correlation p-values shows a significant correlation between paternal age and CCC indels. HR=homopolymer run, CCC=change in copy count (excluding HRs), non-CCC=indels not classified as HR or CCC</a:t>
-            </a:r>
-          </a:p>
-        </p:txBody>
-      </p:sp>
-      <p:sp>
-        <p:nvSpPr>
-          <p:cNvPr id="5" name="TextBox 4">
-            <a:extLst>
-              <a:ext uri="{FF2B5EF4-FFF2-40B4-BE49-F238E27FC236}">
-                <a16:creationId xmlns:a16="http://schemas.microsoft.com/office/drawing/2014/main" id="{83A18805-C1A4-6940-97FB-B8F767F8A71A}"/>
-              </a:ext>
-            </a:extLst>
-          </p:cNvPr>
-          <p:cNvSpPr txBox="1"/>
-          <p:nvPr/>
-        </p:nvSpPr>
-        <p:spPr>
-          <a:xfrm>
-            <a:off x="379527" y="218167"/>
-            <a:ext cx="396262" cy="300082"/>
-          </a:xfrm>
-          <a:prstGeom prst="rect">
-            <a:avLst/>
-          </a:prstGeom>
-          <a:noFill/>
-        </p:spPr>
-        <p:txBody>
-          <a:bodyPr wrap="none" rtlCol="0">
-            <a:spAutoFit/>
-          </a:bodyPr>
-          <a:lstStyle/>
-          <a:p>
-            <a:r>
-              <a:rPr lang="en-US" b="1" dirty="0">
+              <a:t>Scatter plots illustrating the correlation between age at conception and the number of CCC indels, fitted with mixed effects Poisson regression (</a:t>
+            </a:r>
+            <a:r>
+              <a:rPr lang="en-US" sz="1100" b="1" dirty="0">
                 <a:latin typeface="Arial" charset="0"/>
                 <a:ea typeface="Arial" charset="0"/>
                 <a:cs typeface="Arial" charset="0"/>
               </a:rPr>
-              <a:t>(a)</a:t>
+              <a:t>Supplemental Figure 2 </a:t>
+            </a:r>
+            <a:r>
+              <a:rPr lang="en-US" sz="1100" dirty="0">
+                <a:latin typeface="Arial" charset="0"/>
+                <a:ea typeface="Arial" charset="0"/>
+                <a:cs typeface="Arial" charset="0"/>
+              </a:rPr>
+              <a:t>for HR, non-CCC, and all indel scatter plots). HR=homopolymer run, CCC=change in copy count (excluding HRs), non-CCC=indels not classified as HR or CCC</a:t>
             </a:r>
           </a:p>
         </p:txBody>
@@ -4640,8 +5165,8 @@
         </p:nvSpPr>
         <p:spPr>
           <a:xfrm>
-            <a:off x="374718" y="2223908"/>
-            <a:ext cx="405880" cy="300082"/>
+            <a:off x="421657" y="91780"/>
+            <a:ext cx="396262" cy="300082"/>
           </a:xfrm>
           <a:prstGeom prst="rect">
             <a:avLst/>
@@ -4660,7 +5185,7 @@
                 <a:ea typeface="Arial" charset="0"/>
                 <a:cs typeface="Arial" charset="0"/>
               </a:rPr>
-              <a:t>(b)</a:t>
+              <a:t>(a)</a:t>
             </a:r>
           </a:p>
         </p:txBody>
@@ -4680,13 +5205,13 @@
           <p:nvPr>
             <p:extLst>
               <p:ext uri="{D42A27DB-BD31-4B8C-83A1-F6EECF244321}">
-                <p14:modId xmlns:p14="http://schemas.microsoft.com/office/powerpoint/2010/main" val="1519841008"/>
+                <p14:modId xmlns:p14="http://schemas.microsoft.com/office/powerpoint/2010/main" val="2741742646"/>
               </p:ext>
             </p:extLst>
           </p:nvPr>
         </p:nvGraphicFramePr>
         <p:xfrm>
-          <a:off x="4739117" y="2516205"/>
+          <a:off x="768160" y="2525949"/>
           <a:ext cx="2071053" cy="1248226"/>
         </p:xfrm>
         <a:graphic>
@@ -4844,7 +5369,7 @@
                           <a:latin typeface="Arial" panose="020B0604020202020204" pitchFamily="34" charset="0"/>
                           <a:cs typeface="Arial" panose="020B0604020202020204" pitchFamily="34" charset="0"/>
                         </a:rPr>
-                        <a:t>0.37</a:t>
+                        <a:t>0.51</a:t>
                       </a:r>
                       <a:endParaRPr lang="en-US" sz="1000" b="0" i="0" u="none" strike="noStrike" dirty="0">
                         <a:solidFill>
@@ -4892,7 +5417,7 @@
                           <a:latin typeface="Arial" panose="020B0604020202020204" pitchFamily="34" charset="0"/>
                           <a:cs typeface="Arial" panose="020B0604020202020204" pitchFamily="34" charset="0"/>
                         </a:rPr>
-                        <a:t>0.08</a:t>
+                        <a:t>0.033</a:t>
                       </a:r>
                       <a:endParaRPr lang="en-US" sz="1000" b="0" i="0" u="none" strike="noStrike" dirty="0">
                         <a:solidFill>
@@ -4986,7 +5511,7 @@
                           <a:latin typeface="Arial" panose="020B0604020202020204" pitchFamily="34" charset="0"/>
                           <a:cs typeface="Arial" panose="020B0604020202020204" pitchFamily="34" charset="0"/>
                         </a:rPr>
-                        <a:t>0.12</a:t>
+                        <a:t>0.45</a:t>
                       </a:r>
                     </a:p>
                   </a:txBody>
@@ -5033,7 +5558,7 @@
                           <a:latin typeface="Arial" panose="020B0604020202020204" pitchFamily="34" charset="0"/>
                           <a:cs typeface="Arial" panose="020B0604020202020204" pitchFamily="34" charset="0"/>
                         </a:rPr>
-                        <a:t>9.1x10</a:t>
+                        <a:t>7.1x10</a:t>
                       </a:r>
                       <a:r>
                         <a:rPr lang="en-US" sz="1000" b="1" u="none" strike="noStrike" baseline="30000" dirty="0">
@@ -5041,7 +5566,7 @@
                           <a:latin typeface="Arial" panose="020B0604020202020204" pitchFamily="34" charset="0"/>
                           <a:cs typeface="Arial" panose="020B0604020202020204" pitchFamily="34" charset="0"/>
                         </a:rPr>
-                        <a:t>-5</a:t>
+                        <a:t>-3</a:t>
                       </a:r>
                       <a:endParaRPr lang="en-US" sz="1000" b="1" i="0" u="none" strike="noStrike" baseline="30000" dirty="0">
                         <a:solidFill>
@@ -5132,7 +5657,7 @@
                           <a:latin typeface="Arial" panose="020B0604020202020204" pitchFamily="34" charset="0"/>
                           <a:cs typeface="Arial" panose="020B0604020202020204" pitchFamily="34" charset="0"/>
                         </a:rPr>
-                        <a:t>0.17</a:t>
+                        <a:t>0.16</a:t>
                       </a:r>
                       <a:endParaRPr lang="en-US" sz="1000" b="0" i="0" u="none" strike="noStrike" dirty="0">
                         <a:solidFill>
@@ -5180,7 +5705,7 @@
                           <a:latin typeface="Arial" panose="020B0604020202020204" pitchFamily="34" charset="0"/>
                           <a:cs typeface="Arial" panose="020B0604020202020204" pitchFamily="34" charset="0"/>
                         </a:rPr>
-                        <a:t>0.03</a:t>
+                        <a:t>0.054</a:t>
                       </a:r>
                       <a:endParaRPr lang="en-US" sz="1000" b="0" i="0" u="none" strike="noStrike" dirty="0">
                         <a:solidFill>
@@ -5249,7 +5774,7 @@
                           <a:latin typeface="Arial" panose="020B0604020202020204" pitchFamily="34" charset="0"/>
                           <a:cs typeface="Arial" panose="020B0604020202020204" pitchFamily="34" charset="0"/>
                         </a:rPr>
-                        <a:t>0.01</a:t>
+                        <a:t>0.092</a:t>
                       </a:r>
                       <a:endParaRPr lang="en-US" sz="1000" b="0" i="0" u="none" strike="noStrike" dirty="0">
                         <a:solidFill>
@@ -5275,7 +5800,7 @@
                           <a:latin typeface="Arial" panose="020B0604020202020204" pitchFamily="34" charset="0"/>
                           <a:cs typeface="Arial" panose="020B0604020202020204" pitchFamily="34" charset="0"/>
                         </a:rPr>
-                        <a:t>4.2x10</a:t>
+                        <a:t>4.6x10</a:t>
                       </a:r>
                       <a:r>
                         <a:rPr lang="en-US" sz="1000" b="1" u="none" strike="noStrike" baseline="30000" dirty="0">
@@ -5321,7 +5846,7 @@
         </p:nvSpPr>
         <p:spPr>
           <a:xfrm>
-            <a:off x="4880036" y="2231557"/>
+            <a:off x="909079" y="2241301"/>
             <a:ext cx="1789214" cy="276999"/>
           </a:xfrm>
           <a:prstGeom prst="rect">
@@ -5367,7 +5892,46 @@
         </p:nvSpPr>
         <p:spPr>
           <a:xfrm>
-            <a:off x="4385448" y="2223908"/>
+            <a:off x="416848" y="2196094"/>
+            <a:ext cx="405880" cy="300082"/>
+          </a:xfrm>
+          <a:prstGeom prst="rect">
+            <a:avLst/>
+          </a:prstGeom>
+          <a:noFill/>
+        </p:spPr>
+        <p:txBody>
+          <a:bodyPr wrap="none" rtlCol="0">
+            <a:spAutoFit/>
+          </a:bodyPr>
+          <a:lstStyle/>
+          <a:p>
+            <a:r>
+              <a:rPr lang="en-US" b="1" dirty="0">
+                <a:latin typeface="Arial" charset="0"/>
+                <a:ea typeface="Arial" charset="0"/>
+                <a:cs typeface="Arial" charset="0"/>
+              </a:rPr>
+              <a:t>(b)</a:t>
+            </a:r>
+          </a:p>
+        </p:txBody>
+      </p:sp>
+      <p:sp>
+        <p:nvSpPr>
+          <p:cNvPr id="5" name="TextBox 4">
+            <a:extLst>
+              <a:ext uri="{FF2B5EF4-FFF2-40B4-BE49-F238E27FC236}">
+                <a16:creationId xmlns:a16="http://schemas.microsoft.com/office/drawing/2014/main" id="{83A18805-C1A4-6940-97FB-B8F767F8A71A}"/>
+              </a:ext>
+            </a:extLst>
+          </p:cNvPr>
+          <p:cNvSpPr txBox="1"/>
+          <p:nvPr/>
+        </p:nvSpPr>
+        <p:spPr>
+          <a:xfrm>
+            <a:off x="2996433" y="2196094"/>
             <a:ext cx="396262" cy="300082"/>
           </a:xfrm>
           <a:prstGeom prst="rect">
@@ -5394,134 +5958,6 @@
       </p:sp>
       <p:grpSp>
         <p:nvGrpSpPr>
-          <p:cNvPr id="46" name="Group 45">
-            <a:extLst>
-              <a:ext uri="{FF2B5EF4-FFF2-40B4-BE49-F238E27FC236}">
-                <a16:creationId xmlns:a16="http://schemas.microsoft.com/office/drawing/2014/main" id="{7466549A-FB15-8740-B32E-9DB869BC4E3F}"/>
-              </a:ext>
-            </a:extLst>
-          </p:cNvPr>
-          <p:cNvGrpSpPr/>
-          <p:nvPr/>
-        </p:nvGrpSpPr>
-        <p:grpSpPr>
-          <a:xfrm>
-            <a:off x="1396712" y="104477"/>
-            <a:ext cx="5114585" cy="2047911"/>
-            <a:chOff x="1118051" y="171167"/>
-            <a:chExt cx="5114585" cy="2047911"/>
-          </a:xfrm>
-        </p:grpSpPr>
-        <p:pic>
-          <p:nvPicPr>
-            <p:cNvPr id="45" name="Picture 44" descr="A screenshot of a cell phone&#13;&#10;&#13;&#10;Description automatically generated">
-              <a:extLst>
-                <a:ext uri="{FF2B5EF4-FFF2-40B4-BE49-F238E27FC236}">
-                  <a16:creationId xmlns:a16="http://schemas.microsoft.com/office/drawing/2014/main" id="{26AC3075-9821-DF49-92C2-A1D17B8A4070}"/>
-                </a:ext>
-              </a:extLst>
-            </p:cNvPr>
-            <p:cNvPicPr>
-              <a:picLocks noChangeAspect="1"/>
-            </p:cNvPicPr>
-            <p:nvPr/>
-          </p:nvPicPr>
-          <p:blipFill rotWithShape="1">
-            <a:blip r:embed="rId3"/>
-            <a:srcRect r="13931"/>
-            <a:stretch/>
-          </p:blipFill>
-          <p:spPr>
-            <a:xfrm>
-              <a:off x="1228052" y="171167"/>
-              <a:ext cx="5004584" cy="2012744"/>
-            </a:xfrm>
-            <a:prstGeom prst="rect">
-              <a:avLst/>
-            </a:prstGeom>
-          </p:spPr>
-        </p:pic>
-        <p:sp>
-          <p:nvSpPr>
-            <p:cNvPr id="27" name="TextBox 26">
-              <a:extLst>
-                <a:ext uri="{FF2B5EF4-FFF2-40B4-BE49-F238E27FC236}">
-                  <a16:creationId xmlns:a16="http://schemas.microsoft.com/office/drawing/2014/main" id="{16529A30-DA5A-EE44-86EB-8FB03C6FF64A}"/>
-                </a:ext>
-              </a:extLst>
-            </p:cNvPr>
-            <p:cNvSpPr txBox="1"/>
-            <p:nvPr/>
-          </p:nvSpPr>
-          <p:spPr>
-            <a:xfrm>
-              <a:off x="2532964" y="1942079"/>
-              <a:ext cx="2694888" cy="276999"/>
-            </a:xfrm>
-            <a:prstGeom prst="rect">
-              <a:avLst/>
-            </a:prstGeom>
-            <a:noFill/>
-          </p:spPr>
-          <p:txBody>
-            <a:bodyPr wrap="square" rtlCol="0">
-              <a:spAutoFit/>
-            </a:bodyPr>
-            <a:lstStyle/>
-            <a:p>
-              <a:pPr algn="ctr"/>
-              <a:r>
-                <a:rPr lang="en-US" sz="1200" dirty="0">
-                  <a:latin typeface="Arial" panose="020B0604020202020204" pitchFamily="34" charset="0"/>
-                  <a:cs typeface="Arial" panose="020B0604020202020204" pitchFamily="34" charset="0"/>
-                </a:rPr>
-                <a:t>Parental age at conception</a:t>
-              </a:r>
-            </a:p>
-          </p:txBody>
-        </p:sp>
-        <p:sp>
-          <p:nvSpPr>
-            <p:cNvPr id="28" name="TextBox 27">
-              <a:extLst>
-                <a:ext uri="{FF2B5EF4-FFF2-40B4-BE49-F238E27FC236}">
-                  <a16:creationId xmlns:a16="http://schemas.microsoft.com/office/drawing/2014/main" id="{51064FA0-2BB1-2549-BEAF-83FFE7AD512A}"/>
-                </a:ext>
-              </a:extLst>
-            </p:cNvPr>
-            <p:cNvSpPr txBox="1"/>
-            <p:nvPr/>
-          </p:nvSpPr>
-          <p:spPr>
-            <a:xfrm rot="16200000">
-              <a:off x="588276" y="947071"/>
-              <a:ext cx="1336549" cy="276999"/>
-            </a:xfrm>
-            <a:prstGeom prst="rect">
-              <a:avLst/>
-            </a:prstGeom>
-            <a:noFill/>
-          </p:spPr>
-          <p:txBody>
-            <a:bodyPr wrap="square" rtlCol="0">
-              <a:spAutoFit/>
-            </a:bodyPr>
-            <a:lstStyle/>
-            <a:p>
-              <a:pPr algn="ctr"/>
-              <a:r>
-                <a:rPr lang="en-US" sz="1200" dirty="0">
-                  <a:latin typeface="Arial" panose="020B0604020202020204" pitchFamily="34" charset="0"/>
-                  <a:cs typeface="Arial" panose="020B0604020202020204" pitchFamily="34" charset="0"/>
-                </a:rPr>
-                <a:t>CCC indels/trio</a:t>
-              </a:r>
-            </a:p>
-          </p:txBody>
-        </p:sp>
-      </p:grpSp>
-      <p:grpSp>
-        <p:nvGrpSpPr>
           <p:cNvPr id="30" name="Group 29">
             <a:extLst>
               <a:ext uri="{FF2B5EF4-FFF2-40B4-BE49-F238E27FC236}">
@@ -5529,15 +5965,17 @@
               </a:ext>
             </a:extLst>
           </p:cNvPr>
-          <p:cNvGrpSpPr/>
+          <p:cNvGrpSpPr>
+            <a:grpSpLocks noChangeAspect="1"/>
+          </p:cNvGrpSpPr>
           <p:nvPr/>
         </p:nvGrpSpPr>
         <p:grpSpPr>
           <a:xfrm>
-            <a:off x="514249" y="843176"/>
-            <a:ext cx="811634" cy="532270"/>
+            <a:off x="5707045" y="806916"/>
+            <a:ext cx="1067026" cy="664727"/>
             <a:chOff x="4211674" y="3554936"/>
-            <a:chExt cx="811634" cy="532270"/>
+            <a:chExt cx="811634" cy="505625"/>
           </a:xfrm>
         </p:grpSpPr>
         <p:pic>
@@ -5555,7 +5993,7 @@
             <p:nvPr/>
           </p:nvPicPr>
           <p:blipFill rotWithShape="1">
-            <a:blip r:embed="rId4"/>
+            <a:blip r:embed="rId5"/>
             <a:srcRect l="87372" t="41512" r="7967" b="43489"/>
             <a:stretch/>
           </p:blipFill>
@@ -5584,7 +6022,7 @@
           <p:spPr>
             <a:xfrm>
               <a:off x="4392827" y="3840986"/>
-              <a:ext cx="630480" cy="246220"/>
+              <a:ext cx="630480" cy="210700"/>
             </a:xfrm>
             <a:prstGeom prst="rect">
               <a:avLst/>
@@ -5598,7 +6036,7 @@
             <a:lstStyle/>
             <a:p>
               <a:r>
-                <a:rPr lang="en-US" sz="1000" dirty="0">
+                <a:rPr lang="en-US" sz="1200" dirty="0">
                   <a:latin typeface="Arial" panose="020B0604020202020204" pitchFamily="34" charset="0"/>
                   <a:cs typeface="Arial" panose="020B0604020202020204" pitchFamily="34" charset="0"/>
                 </a:rPr>
@@ -5622,7 +6060,7 @@
           <p:spPr>
             <a:xfrm>
               <a:off x="4392827" y="3554936"/>
-              <a:ext cx="630481" cy="246220"/>
+              <a:ext cx="630481" cy="210699"/>
             </a:xfrm>
             <a:prstGeom prst="rect">
               <a:avLst/>
@@ -5636,7 +6074,7 @@
             <a:lstStyle/>
             <a:p>
               <a:r>
-                <a:rPr lang="en-US" sz="1000" dirty="0">
+                <a:rPr lang="en-US" sz="1200" dirty="0">
                   <a:latin typeface="Arial" panose="020B0604020202020204" pitchFamily="34" charset="0"/>
                   <a:cs typeface="Arial" panose="020B0604020202020204" pitchFamily="34" charset="0"/>
                 </a:rPr>
@@ -5660,7 +6098,7 @@
             <p:nvPr/>
           </p:nvPicPr>
           <p:blipFill rotWithShape="1">
-            <a:blip r:embed="rId4"/>
+            <a:blip r:embed="rId5"/>
             <a:srcRect l="87372" t="57079" r="7967" b="25684"/>
             <a:stretch/>
           </p:blipFill>
@@ -5977,190 +6415,230 @@
       </p:sp>
       <p:grpSp>
         <p:nvGrpSpPr>
-          <p:cNvPr id="16" name="Group 15">
+          <p:cNvPr id="27" name="Group 26">
             <a:extLst>
               <a:ext uri="{FF2B5EF4-FFF2-40B4-BE49-F238E27FC236}">
-                <a16:creationId xmlns:a16="http://schemas.microsoft.com/office/drawing/2014/main" id="{31ACBE36-7F3F-F74A-A0DE-2A48AEDE2291}"/>
+                <a16:creationId xmlns:a16="http://schemas.microsoft.com/office/drawing/2014/main" id="{B7C8CF1E-55F2-3A4F-865F-CA6E610E50AC}"/>
               </a:ext>
             </a:extLst>
           </p:cNvPr>
-          <p:cNvGrpSpPr>
-            <a:grpSpLocks noChangeAspect="1"/>
-          </p:cNvGrpSpPr>
+          <p:cNvGrpSpPr/>
           <p:nvPr/>
         </p:nvGrpSpPr>
         <p:grpSpPr>
           <a:xfrm>
-            <a:off x="718103" y="151101"/>
-            <a:ext cx="5543213" cy="4373285"/>
-            <a:chOff x="717778" y="176725"/>
-            <a:chExt cx="5729517" cy="4520269"/>
+            <a:off x="718103" y="271049"/>
+            <a:ext cx="6051772" cy="4290495"/>
+            <a:chOff x="718103" y="271049"/>
+            <a:chExt cx="6051772" cy="4290495"/>
           </a:xfrm>
         </p:grpSpPr>
-        <p:pic>
-          <p:nvPicPr>
-            <p:cNvPr id="8" name="Picture 7" descr="A screenshot of a map&#13;&#10;&#13;&#10;Description automatically generated">
+        <p:grpSp>
+          <p:nvGrpSpPr>
+            <p:cNvPr id="26" name="Group 25">
               <a:extLst>
                 <a:ext uri="{FF2B5EF4-FFF2-40B4-BE49-F238E27FC236}">
-                  <a16:creationId xmlns:a16="http://schemas.microsoft.com/office/drawing/2014/main" id="{276785FD-34E6-9745-9616-2C8D6D935D23}"/>
+                  <a16:creationId xmlns:a16="http://schemas.microsoft.com/office/drawing/2014/main" id="{F1AD1545-CAF6-AF45-805A-43C5E08F88BE}"/>
                 </a:ext>
               </a:extLst>
             </p:cNvPr>
-            <p:cNvPicPr>
-              <a:picLocks noChangeAspect="1"/>
-            </p:cNvPicPr>
+            <p:cNvGrpSpPr/>
             <p:nvPr/>
-          </p:nvPicPr>
-          <p:blipFill rotWithShape="1">
-            <a:blip r:embed="rId2"/>
-            <a:srcRect t="21722" r="13485" b="10183"/>
-            <a:stretch/>
-          </p:blipFill>
-          <p:spPr>
+          </p:nvGrpSpPr>
+          <p:grpSpPr>
             <a:xfrm>
-              <a:off x="1821051" y="3150255"/>
-              <a:ext cx="4626244" cy="1260429"/>
+              <a:off x="1694010" y="271049"/>
+              <a:ext cx="3918642" cy="4290495"/>
+              <a:chOff x="1694010" y="271049"/>
+              <a:chExt cx="3918642" cy="4290495"/>
             </a:xfrm>
-            <a:prstGeom prst="rect">
-              <a:avLst/>
-            </a:prstGeom>
-          </p:spPr>
-        </p:pic>
-        <p:pic>
-          <p:nvPicPr>
-            <p:cNvPr id="6" name="Picture 5" descr="A screenshot of a cell phone&#13;&#10;&#13;&#10;Description automatically generated">
-              <a:extLst>
-                <a:ext uri="{FF2B5EF4-FFF2-40B4-BE49-F238E27FC236}">
-                  <a16:creationId xmlns:a16="http://schemas.microsoft.com/office/drawing/2014/main" id="{12A8AB5E-8F57-A449-AEB5-3D62180C38CD}"/>
-                </a:ext>
-              </a:extLst>
-            </p:cNvPr>
-            <p:cNvPicPr>
-              <a:picLocks noChangeAspect="1"/>
-            </p:cNvPicPr>
-            <p:nvPr/>
-          </p:nvPicPr>
-          <p:blipFill rotWithShape="1">
-            <a:blip r:embed="rId3"/>
-            <a:srcRect t="20262" r="13485" b="10183"/>
-            <a:stretch/>
-          </p:blipFill>
-          <p:spPr>
-            <a:xfrm>
-              <a:off x="1876526" y="1804382"/>
-              <a:ext cx="4570769" cy="1272032"/>
-            </a:xfrm>
-            <a:prstGeom prst="rect">
-              <a:avLst/>
-            </a:prstGeom>
-          </p:spPr>
-        </p:pic>
-        <p:pic>
-          <p:nvPicPr>
-            <p:cNvPr id="4" name="Picture 3" descr="A screenshot of a cell phone&#13;&#10;&#13;&#10;Description automatically generated">
-              <a:extLst>
-                <a:ext uri="{FF2B5EF4-FFF2-40B4-BE49-F238E27FC236}">
-                  <a16:creationId xmlns:a16="http://schemas.microsoft.com/office/drawing/2014/main" id="{468BD372-CE9B-554E-A580-0302E2F4F1A9}"/>
-                </a:ext>
-              </a:extLst>
-            </p:cNvPr>
-            <p:cNvPicPr>
-              <a:picLocks noChangeAspect="1"/>
-            </p:cNvPicPr>
-            <p:nvPr/>
-          </p:nvPicPr>
-          <p:blipFill rotWithShape="1">
-            <a:blip r:embed="rId4"/>
-            <a:srcRect r="13485" b="10364"/>
-            <a:stretch/>
-          </p:blipFill>
-          <p:spPr>
-            <a:xfrm>
-              <a:off x="1876526" y="176725"/>
-              <a:ext cx="4570769" cy="1639260"/>
-            </a:xfrm>
-            <a:prstGeom prst="rect">
-              <a:avLst/>
-            </a:prstGeom>
-          </p:spPr>
-        </p:pic>
-        <p:sp>
-          <p:nvSpPr>
-            <p:cNvPr id="9" name="TextBox 8">
-              <a:extLst>
-                <a:ext uri="{FF2B5EF4-FFF2-40B4-BE49-F238E27FC236}">
-                  <a16:creationId xmlns:a16="http://schemas.microsoft.com/office/drawing/2014/main" id="{21B80437-D34A-434E-94B8-1986D8A41721}"/>
-                </a:ext>
-              </a:extLst>
-            </p:cNvPr>
-            <p:cNvSpPr txBox="1"/>
-            <p:nvPr/>
-          </p:nvSpPr>
-          <p:spPr>
-            <a:xfrm rot="16200000">
-              <a:off x="1260010" y="2224857"/>
-              <a:ext cx="1233030" cy="300082"/>
-            </a:xfrm>
-            <a:prstGeom prst="rect">
-              <a:avLst/>
-            </a:prstGeom>
-            <a:noFill/>
-          </p:spPr>
-          <p:txBody>
-            <a:bodyPr wrap="none" rtlCol="0">
-              <a:spAutoFit/>
-            </a:bodyPr>
-            <a:lstStyle/>
-            <a:p>
-              <a:r>
-                <a:rPr lang="en-US" dirty="0">
-                  <a:latin typeface="Arial" panose="020B0604020202020204" pitchFamily="34" charset="0"/>
-                  <a:cs typeface="Arial" panose="020B0604020202020204" pitchFamily="34" charset="0"/>
-                </a:rPr>
-                <a:t>Indels per trio</a:t>
-              </a:r>
-            </a:p>
-          </p:txBody>
-        </p:sp>
-        <p:sp>
-          <p:nvSpPr>
-            <p:cNvPr id="10" name="TextBox 9">
-              <a:extLst>
-                <a:ext uri="{FF2B5EF4-FFF2-40B4-BE49-F238E27FC236}">
-                  <a16:creationId xmlns:a16="http://schemas.microsoft.com/office/drawing/2014/main" id="{EB8C5BB7-402E-C740-A9B2-803321599669}"/>
-                </a:ext>
-              </a:extLst>
-            </p:cNvPr>
-            <p:cNvSpPr txBox="1"/>
-            <p:nvPr/>
-          </p:nvSpPr>
-          <p:spPr>
-            <a:xfrm>
-              <a:off x="2873619" y="4410685"/>
-              <a:ext cx="2694888" cy="286309"/>
-            </a:xfrm>
-            <a:prstGeom prst="rect">
-              <a:avLst/>
-            </a:prstGeom>
-            <a:noFill/>
-          </p:spPr>
-          <p:txBody>
-            <a:bodyPr wrap="square" rtlCol="0">
-              <a:spAutoFit/>
-            </a:bodyPr>
-            <a:lstStyle/>
-            <a:p>
-              <a:pPr algn="ctr"/>
-              <a:r>
-                <a:rPr lang="en-US" sz="1200" dirty="0">
-                  <a:latin typeface="Arial" panose="020B0604020202020204" pitchFamily="34" charset="0"/>
-                  <a:cs typeface="Arial" panose="020B0604020202020204" pitchFamily="34" charset="0"/>
-                </a:rPr>
-                <a:t>Parental age at conception</a:t>
-              </a:r>
-            </a:p>
-          </p:txBody>
-        </p:sp>
+          </p:grpSpPr>
+          <p:grpSp>
+            <p:nvGrpSpPr>
+              <p:cNvPr id="25" name="Group 24">
+                <a:extLst>
+                  <a:ext uri="{FF2B5EF4-FFF2-40B4-BE49-F238E27FC236}">
+                    <a16:creationId xmlns:a16="http://schemas.microsoft.com/office/drawing/2014/main" id="{919B68BC-4CF7-374F-9A3C-F8981A52AE3B}"/>
+                  </a:ext>
+                </a:extLst>
+              </p:cNvPr>
+              <p:cNvGrpSpPr/>
+              <p:nvPr/>
+            </p:nvGrpSpPr>
+            <p:grpSpPr>
+              <a:xfrm>
+                <a:off x="1742672" y="271049"/>
+                <a:ext cx="3869980" cy="4013496"/>
+                <a:chOff x="1971272" y="445356"/>
+                <a:chExt cx="3869980" cy="4013496"/>
+              </a:xfrm>
+            </p:grpSpPr>
+            <p:pic>
+              <p:nvPicPr>
+                <p:cNvPr id="24" name="Picture 23">
+                  <a:extLst>
+                    <a:ext uri="{FF2B5EF4-FFF2-40B4-BE49-F238E27FC236}">
+                      <a16:creationId xmlns:a16="http://schemas.microsoft.com/office/drawing/2014/main" id="{35E9FB99-6CF7-8040-91A8-A28C47EFDBA0}"/>
+                    </a:ext>
+                  </a:extLst>
+                </p:cNvPr>
+                <p:cNvPicPr>
+                  <a:picLocks noChangeAspect="1"/>
+                </p:cNvPicPr>
+                <p:nvPr/>
+              </p:nvPicPr>
+              <p:blipFill rotWithShape="1">
+                <a:blip r:embed="rId2"/>
+                <a:srcRect t="22645" r="18526" b="12580"/>
+                <a:stretch/>
+              </p:blipFill>
+              <p:spPr>
+                <a:xfrm>
+                  <a:off x="1971272" y="3228132"/>
+                  <a:ext cx="3869980" cy="1230720"/>
+                </a:xfrm>
+                <a:prstGeom prst="rect">
+                  <a:avLst/>
+                </a:prstGeom>
+              </p:spPr>
+            </p:pic>
+            <p:pic>
+              <p:nvPicPr>
+                <p:cNvPr id="11" name="Picture 10">
+                  <a:extLst>
+                    <a:ext uri="{FF2B5EF4-FFF2-40B4-BE49-F238E27FC236}">
+                      <a16:creationId xmlns:a16="http://schemas.microsoft.com/office/drawing/2014/main" id="{9FD464A7-BEDD-9445-BFF6-D26586EF3558}"/>
+                    </a:ext>
+                  </a:extLst>
+                </p:cNvPr>
+                <p:cNvPicPr>
+                  <a:picLocks noChangeAspect="1"/>
+                </p:cNvPicPr>
+                <p:nvPr/>
+              </p:nvPicPr>
+              <p:blipFill rotWithShape="1">
+                <a:blip r:embed="rId3"/>
+                <a:srcRect t="22544" r="18526" b="13075"/>
+                <a:stretch/>
+              </p:blipFill>
+              <p:spPr>
+                <a:xfrm>
+                  <a:off x="2046492" y="2049535"/>
+                  <a:ext cx="3794760" cy="1199432"/>
+                </a:xfrm>
+                <a:prstGeom prst="rect">
+                  <a:avLst/>
+                </a:prstGeom>
+              </p:spPr>
+            </p:pic>
+            <p:pic>
+              <p:nvPicPr>
+                <p:cNvPr id="5" name="Picture 4">
+                  <a:extLst>
+                    <a:ext uri="{FF2B5EF4-FFF2-40B4-BE49-F238E27FC236}">
+                      <a16:creationId xmlns:a16="http://schemas.microsoft.com/office/drawing/2014/main" id="{742743D7-6E58-DE4C-BCE3-0B7C1973DFCE}"/>
+                    </a:ext>
+                  </a:extLst>
+                </p:cNvPr>
+                <p:cNvPicPr>
+                  <a:picLocks noChangeAspect="1"/>
+                </p:cNvPicPr>
+                <p:nvPr/>
+              </p:nvPicPr>
+              <p:blipFill rotWithShape="1">
+                <a:blip r:embed="rId4"/>
+                <a:srcRect r="18526" b="12844"/>
+                <a:stretch/>
+              </p:blipFill>
+              <p:spPr>
+                <a:xfrm>
+                  <a:off x="2046492" y="445356"/>
+                  <a:ext cx="3794760" cy="1623761"/>
+                </a:xfrm>
+                <a:prstGeom prst="rect">
+                  <a:avLst/>
+                </a:prstGeom>
+              </p:spPr>
+            </p:pic>
+          </p:grpSp>
+          <p:sp>
+            <p:nvSpPr>
+              <p:cNvPr id="9" name="TextBox 8">
+                <a:extLst>
+                  <a:ext uri="{FF2B5EF4-FFF2-40B4-BE49-F238E27FC236}">
+                    <a16:creationId xmlns:a16="http://schemas.microsoft.com/office/drawing/2014/main" id="{21B80437-D34A-434E-94B8-1986D8A41721}"/>
+                  </a:ext>
+                </a:extLst>
+              </p:cNvPr>
+              <p:cNvSpPr txBox="1"/>
+              <p:nvPr/>
+            </p:nvSpPr>
+            <p:spPr>
+              <a:xfrm rot="16200000">
+                <a:off x="1242704" y="2132635"/>
+                <a:ext cx="1192936" cy="290324"/>
+              </a:xfrm>
+              <a:prstGeom prst="rect">
+                <a:avLst/>
+              </a:prstGeom>
+              <a:noFill/>
+            </p:spPr>
+            <p:txBody>
+              <a:bodyPr wrap="none" rtlCol="0">
+                <a:spAutoFit/>
+              </a:bodyPr>
+              <a:lstStyle/>
+              <a:p>
+                <a:r>
+                  <a:rPr lang="en-US" dirty="0">
+                    <a:latin typeface="Arial" panose="020B0604020202020204" pitchFamily="34" charset="0"/>
+                    <a:cs typeface="Arial" panose="020B0604020202020204" pitchFamily="34" charset="0"/>
+                  </a:rPr>
+                  <a:t>Indels per trio</a:t>
+                </a:r>
+              </a:p>
+            </p:txBody>
+          </p:sp>
+          <p:sp>
+            <p:nvSpPr>
+              <p:cNvPr id="10" name="TextBox 9">
+                <a:extLst>
+                  <a:ext uri="{FF2B5EF4-FFF2-40B4-BE49-F238E27FC236}">
+                    <a16:creationId xmlns:a16="http://schemas.microsoft.com/office/drawing/2014/main" id="{EB8C5BB7-402E-C740-A9B2-803321599669}"/>
+                  </a:ext>
+                </a:extLst>
+              </p:cNvPr>
+              <p:cNvSpPr txBox="1"/>
+              <p:nvPr/>
+            </p:nvSpPr>
+            <p:spPr>
+              <a:xfrm>
+                <a:off x="2581775" y="4284545"/>
+                <a:ext cx="2607260" cy="276999"/>
+              </a:xfrm>
+              <a:prstGeom prst="rect">
+                <a:avLst/>
+              </a:prstGeom>
+              <a:noFill/>
+            </p:spPr>
+            <p:txBody>
+              <a:bodyPr wrap="square" rtlCol="0">
+                <a:spAutoFit/>
+              </a:bodyPr>
+              <a:lstStyle/>
+              <a:p>
+                <a:pPr algn="ctr"/>
+                <a:r>
+                  <a:rPr lang="en-US" sz="1200" dirty="0">
+                    <a:latin typeface="Arial" panose="020B0604020202020204" pitchFamily="34" charset="0"/>
+                    <a:cs typeface="Arial" panose="020B0604020202020204" pitchFamily="34" charset="0"/>
+                  </a:rPr>
+                  <a:t>Parental age at conception</a:t>
+                </a:r>
+              </a:p>
+            </p:txBody>
+          </p:sp>
+        </p:grpSp>
         <p:sp>
           <p:nvSpPr>
             <p:cNvPr id="12" name="TextBox 11">
@@ -6175,8 +6653,8 @@
           </p:nvSpPr>
           <p:spPr>
             <a:xfrm>
-              <a:off x="910718" y="899634"/>
-              <a:ext cx="568582" cy="276999"/>
+              <a:off x="904769" y="850503"/>
+              <a:ext cx="550094" cy="267992"/>
             </a:xfrm>
             <a:prstGeom prst="rect">
               <a:avLst/>
@@ -6219,8 +6697,8 @@
           </p:nvSpPr>
           <p:spPr>
             <a:xfrm>
-              <a:off x="717778" y="2219793"/>
-              <a:ext cx="954463" cy="276999"/>
+              <a:off x="718103" y="2127735"/>
+              <a:ext cx="923427" cy="267992"/>
             </a:xfrm>
             <a:prstGeom prst="rect">
               <a:avLst/>
@@ -6263,8 +6741,8 @@
           </p:nvSpPr>
           <p:spPr>
             <a:xfrm>
-              <a:off x="957213" y="3475291"/>
-              <a:ext cx="475592" cy="276999"/>
+              <a:off x="949752" y="3342409"/>
+              <a:ext cx="460127" cy="267992"/>
             </a:xfrm>
             <a:prstGeom prst="rect">
               <a:avLst/>
@@ -6293,161 +6771,161 @@
             </a:p>
           </p:txBody>
         </p:sp>
-      </p:grpSp>
-      <p:grpSp>
-        <p:nvGrpSpPr>
-          <p:cNvPr id="17" name="Group 16">
-            <a:extLst>
-              <a:ext uri="{FF2B5EF4-FFF2-40B4-BE49-F238E27FC236}">
-                <a16:creationId xmlns:a16="http://schemas.microsoft.com/office/drawing/2014/main" id="{1FBF46FC-3E1B-CA4B-97B0-194DCBA8CAEB}"/>
-              </a:ext>
-            </a:extLst>
-          </p:cNvPr>
-          <p:cNvGrpSpPr/>
-          <p:nvPr/>
-        </p:nvGrpSpPr>
-        <p:grpSpPr>
-          <a:xfrm>
-            <a:off x="6781201" y="1874846"/>
-            <a:ext cx="811634" cy="532270"/>
-            <a:chOff x="4211674" y="3554936"/>
-            <a:chExt cx="811634" cy="532270"/>
-          </a:xfrm>
-        </p:grpSpPr>
-        <p:pic>
-          <p:nvPicPr>
-            <p:cNvPr id="18" name="Picture 17" descr="A screenshot of a cell phone&#13;&#10;&#13;&#10;Description automatically generated">
+        <p:grpSp>
+          <p:nvGrpSpPr>
+            <p:cNvPr id="17" name="Group 16">
               <a:extLst>
                 <a:ext uri="{FF2B5EF4-FFF2-40B4-BE49-F238E27FC236}">
-                  <a16:creationId xmlns:a16="http://schemas.microsoft.com/office/drawing/2014/main" id="{3D1A6546-20A5-9A49-A561-4906C8710D47}"/>
+                  <a16:creationId xmlns:a16="http://schemas.microsoft.com/office/drawing/2014/main" id="{1FBF46FC-3E1B-CA4B-97B0-194DCBA8CAEB}"/>
                 </a:ext>
               </a:extLst>
             </p:cNvPr>
-            <p:cNvPicPr>
-              <a:picLocks noChangeAspect="1"/>
-            </p:cNvPicPr>
+            <p:cNvGrpSpPr/>
             <p:nvPr/>
-          </p:nvPicPr>
-          <p:blipFill rotWithShape="1">
-            <a:blip r:embed="rId5"/>
-            <a:srcRect l="87372" t="41512" r="7967" b="43489"/>
-            <a:stretch/>
-          </p:blipFill>
-          <p:spPr>
+          </p:nvGrpSpPr>
+          <p:grpSpPr>
             <a:xfrm>
-              <a:off x="4211674" y="3867632"/>
-              <a:ext cx="232071" cy="192929"/>
+              <a:off x="5958241" y="2127735"/>
+              <a:ext cx="811634" cy="532270"/>
+              <a:chOff x="4211674" y="3554936"/>
+              <a:chExt cx="811634" cy="532270"/>
             </a:xfrm>
-            <a:prstGeom prst="rect">
-              <a:avLst/>
-            </a:prstGeom>
-          </p:spPr>
-        </p:pic>
-        <p:sp>
-          <p:nvSpPr>
-            <p:cNvPr id="19" name="TextBox 18">
-              <a:extLst>
-                <a:ext uri="{FF2B5EF4-FFF2-40B4-BE49-F238E27FC236}">
-                  <a16:creationId xmlns:a16="http://schemas.microsoft.com/office/drawing/2014/main" id="{1254E758-ED38-3546-944F-BA816BE42937}"/>
-                </a:ext>
-              </a:extLst>
-            </p:cNvPr>
-            <p:cNvSpPr txBox="1"/>
-            <p:nvPr/>
-          </p:nvSpPr>
-          <p:spPr>
-            <a:xfrm>
-              <a:off x="4392827" y="3840986"/>
-              <a:ext cx="630480" cy="246220"/>
-            </a:xfrm>
-            <a:prstGeom prst="rect">
-              <a:avLst/>
-            </a:prstGeom>
-            <a:noFill/>
-          </p:spPr>
-          <p:txBody>
-            <a:bodyPr wrap="square" rtlCol="0">
-              <a:spAutoFit/>
-            </a:bodyPr>
-            <a:lstStyle/>
-            <a:p>
-              <a:r>
-                <a:rPr lang="en-US" sz="1000" dirty="0">
-                  <a:latin typeface="Arial" panose="020B0604020202020204" pitchFamily="34" charset="0"/>
-                  <a:cs typeface="Arial" panose="020B0604020202020204" pitchFamily="34" charset="0"/>
-                </a:rPr>
-                <a:t>Father</a:t>
-              </a:r>
-            </a:p>
-          </p:txBody>
-        </p:sp>
-        <p:sp>
-          <p:nvSpPr>
-            <p:cNvPr id="20" name="TextBox 19">
-              <a:extLst>
-                <a:ext uri="{FF2B5EF4-FFF2-40B4-BE49-F238E27FC236}">
-                  <a16:creationId xmlns:a16="http://schemas.microsoft.com/office/drawing/2014/main" id="{BA2142EF-8642-594F-AAC4-E92155513037}"/>
-                </a:ext>
-              </a:extLst>
-            </p:cNvPr>
-            <p:cNvSpPr txBox="1"/>
-            <p:nvPr/>
-          </p:nvSpPr>
-          <p:spPr>
-            <a:xfrm>
-              <a:off x="4392827" y="3554936"/>
-              <a:ext cx="630481" cy="246220"/>
-            </a:xfrm>
-            <a:prstGeom prst="rect">
-              <a:avLst/>
-            </a:prstGeom>
-            <a:noFill/>
-          </p:spPr>
-          <p:txBody>
-            <a:bodyPr wrap="square" rtlCol="0">
-              <a:spAutoFit/>
-            </a:bodyPr>
-            <a:lstStyle/>
-            <a:p>
-              <a:r>
-                <a:rPr lang="en-US" sz="1000" dirty="0">
-                  <a:latin typeface="Arial" panose="020B0604020202020204" pitchFamily="34" charset="0"/>
-                  <a:cs typeface="Arial" panose="020B0604020202020204" pitchFamily="34" charset="0"/>
-                </a:rPr>
-                <a:t>Mother</a:t>
-              </a:r>
-            </a:p>
-          </p:txBody>
-        </p:sp>
-        <p:pic>
-          <p:nvPicPr>
-            <p:cNvPr id="21" name="Picture 20" descr="A screenshot of a cell phone&#13;&#10;&#13;&#10;Description automatically generated">
-              <a:extLst>
-                <a:ext uri="{FF2B5EF4-FFF2-40B4-BE49-F238E27FC236}">
-                  <a16:creationId xmlns:a16="http://schemas.microsoft.com/office/drawing/2014/main" id="{8A07AA58-4559-3A4F-BEFF-F6D703A2414F}"/>
-                </a:ext>
-              </a:extLst>
-            </p:cNvPr>
-            <p:cNvPicPr>
-              <a:picLocks noChangeAspect="1"/>
-            </p:cNvPicPr>
-            <p:nvPr/>
-          </p:nvPicPr>
-          <p:blipFill rotWithShape="1">
-            <a:blip r:embed="rId5"/>
-            <a:srcRect l="87372" t="57079" r="7967" b="25684"/>
-            <a:stretch/>
-          </p:blipFill>
-          <p:spPr>
-            <a:xfrm>
-              <a:off x="4211676" y="3567192"/>
-              <a:ext cx="232071" cy="221709"/>
-            </a:xfrm>
-            <a:prstGeom prst="rect">
-              <a:avLst/>
-            </a:prstGeom>
-          </p:spPr>
-        </p:pic>
+          </p:grpSpPr>
+          <p:pic>
+            <p:nvPicPr>
+              <p:cNvPr id="18" name="Picture 17" descr="A screenshot of a cell phone&#13;&#10;&#13;&#10;Description automatically generated">
+                <a:extLst>
+                  <a:ext uri="{FF2B5EF4-FFF2-40B4-BE49-F238E27FC236}">
+                    <a16:creationId xmlns:a16="http://schemas.microsoft.com/office/drawing/2014/main" id="{3D1A6546-20A5-9A49-A561-4906C8710D47}"/>
+                  </a:ext>
+                </a:extLst>
+              </p:cNvPr>
+              <p:cNvPicPr>
+                <a:picLocks noChangeAspect="1"/>
+              </p:cNvPicPr>
+              <p:nvPr/>
+            </p:nvPicPr>
+            <p:blipFill rotWithShape="1">
+              <a:blip r:embed="rId5"/>
+              <a:srcRect l="87372" t="41512" r="7967" b="43489"/>
+              <a:stretch/>
+            </p:blipFill>
+            <p:spPr>
+              <a:xfrm>
+                <a:off x="4211674" y="3867632"/>
+                <a:ext cx="232071" cy="192929"/>
+              </a:xfrm>
+              <a:prstGeom prst="rect">
+                <a:avLst/>
+              </a:prstGeom>
+            </p:spPr>
+          </p:pic>
+          <p:sp>
+            <p:nvSpPr>
+              <p:cNvPr id="19" name="TextBox 18">
+                <a:extLst>
+                  <a:ext uri="{FF2B5EF4-FFF2-40B4-BE49-F238E27FC236}">
+                    <a16:creationId xmlns:a16="http://schemas.microsoft.com/office/drawing/2014/main" id="{1254E758-ED38-3546-944F-BA816BE42937}"/>
+                  </a:ext>
+                </a:extLst>
+              </p:cNvPr>
+              <p:cNvSpPr txBox="1"/>
+              <p:nvPr/>
+            </p:nvSpPr>
+            <p:spPr>
+              <a:xfrm>
+                <a:off x="4392827" y="3840986"/>
+                <a:ext cx="630480" cy="246220"/>
+              </a:xfrm>
+              <a:prstGeom prst="rect">
+                <a:avLst/>
+              </a:prstGeom>
+              <a:noFill/>
+            </p:spPr>
+            <p:txBody>
+              <a:bodyPr wrap="square" rtlCol="0">
+                <a:spAutoFit/>
+              </a:bodyPr>
+              <a:lstStyle/>
+              <a:p>
+                <a:r>
+                  <a:rPr lang="en-US" sz="1000" dirty="0">
+                    <a:latin typeface="Arial" panose="020B0604020202020204" pitchFamily="34" charset="0"/>
+                    <a:cs typeface="Arial" panose="020B0604020202020204" pitchFamily="34" charset="0"/>
+                  </a:rPr>
+                  <a:t>Father</a:t>
+                </a:r>
+              </a:p>
+            </p:txBody>
+          </p:sp>
+          <p:sp>
+            <p:nvSpPr>
+              <p:cNvPr id="20" name="TextBox 19">
+                <a:extLst>
+                  <a:ext uri="{FF2B5EF4-FFF2-40B4-BE49-F238E27FC236}">
+                    <a16:creationId xmlns:a16="http://schemas.microsoft.com/office/drawing/2014/main" id="{BA2142EF-8642-594F-AAC4-E92155513037}"/>
+                  </a:ext>
+                </a:extLst>
+              </p:cNvPr>
+              <p:cNvSpPr txBox="1"/>
+              <p:nvPr/>
+            </p:nvSpPr>
+            <p:spPr>
+              <a:xfrm>
+                <a:off x="4392827" y="3554936"/>
+                <a:ext cx="630481" cy="246220"/>
+              </a:xfrm>
+              <a:prstGeom prst="rect">
+                <a:avLst/>
+              </a:prstGeom>
+              <a:noFill/>
+            </p:spPr>
+            <p:txBody>
+              <a:bodyPr wrap="square" rtlCol="0">
+                <a:spAutoFit/>
+              </a:bodyPr>
+              <a:lstStyle/>
+              <a:p>
+                <a:r>
+                  <a:rPr lang="en-US" sz="1000" dirty="0">
+                    <a:latin typeface="Arial" panose="020B0604020202020204" pitchFamily="34" charset="0"/>
+                    <a:cs typeface="Arial" panose="020B0604020202020204" pitchFamily="34" charset="0"/>
+                  </a:rPr>
+                  <a:t>Mother</a:t>
+                </a:r>
+              </a:p>
+            </p:txBody>
+          </p:sp>
+          <p:pic>
+            <p:nvPicPr>
+              <p:cNvPr id="21" name="Picture 20" descr="A screenshot of a cell phone&#13;&#10;&#13;&#10;Description automatically generated">
+                <a:extLst>
+                  <a:ext uri="{FF2B5EF4-FFF2-40B4-BE49-F238E27FC236}">
+                    <a16:creationId xmlns:a16="http://schemas.microsoft.com/office/drawing/2014/main" id="{8A07AA58-4559-3A4F-BEFF-F6D703A2414F}"/>
+                  </a:ext>
+                </a:extLst>
+              </p:cNvPr>
+              <p:cNvPicPr>
+                <a:picLocks noChangeAspect="1"/>
+              </p:cNvPicPr>
+              <p:nvPr/>
+            </p:nvPicPr>
+            <p:blipFill rotWithShape="1">
+              <a:blip r:embed="rId5"/>
+              <a:srcRect l="87372" t="57079" r="7967" b="25684"/>
+              <a:stretch/>
+            </p:blipFill>
+            <p:spPr>
+              <a:xfrm>
+                <a:off x="4211676" y="3567192"/>
+                <a:ext cx="232071" cy="221709"/>
+              </a:xfrm>
+              <a:prstGeom prst="rect">
+                <a:avLst/>
+              </a:prstGeom>
+            </p:spPr>
+          </p:pic>
+        </p:grpSp>
       </p:grpSp>
     </p:spTree>
     <p:extLst>
@@ -6560,10 +7038,10 @@
       </p:sp>
       <p:grpSp>
         <p:nvGrpSpPr>
-          <p:cNvPr id="26" name="Group 25">
+          <p:cNvPr id="10" name="Group 9">
             <a:extLst>
               <a:ext uri="{FF2B5EF4-FFF2-40B4-BE49-F238E27FC236}">
-                <a16:creationId xmlns:a16="http://schemas.microsoft.com/office/drawing/2014/main" id="{DED8B1E2-D8B1-4C48-A15B-02B0343054C0}"/>
+                <a16:creationId xmlns:a16="http://schemas.microsoft.com/office/drawing/2014/main" id="{8A485B36-2F0D-7147-A1EE-369CA8D25870}"/>
               </a:ext>
             </a:extLst>
           </p:cNvPr>
@@ -6572,12 +7050,120 @@
         </p:nvGrpSpPr>
         <p:grpSpPr>
           <a:xfrm>
-            <a:off x="322896" y="425413"/>
-            <a:ext cx="6041267" cy="3850149"/>
-            <a:chOff x="772346" y="425413"/>
-            <a:chExt cx="6041267" cy="3850149"/>
+            <a:off x="1315432" y="223037"/>
+            <a:ext cx="4980333" cy="4097568"/>
+            <a:chOff x="1504615" y="177994"/>
+            <a:chExt cx="4980333" cy="4097568"/>
           </a:xfrm>
         </p:grpSpPr>
+        <p:grpSp>
+          <p:nvGrpSpPr>
+            <p:cNvPr id="9" name="Group 8">
+              <a:extLst>
+                <a:ext uri="{FF2B5EF4-FFF2-40B4-BE49-F238E27FC236}">
+                  <a16:creationId xmlns:a16="http://schemas.microsoft.com/office/drawing/2014/main" id="{3C2D6741-2170-4D4F-9E26-70340B1AE3F1}"/>
+                </a:ext>
+              </a:extLst>
+            </p:cNvPr>
+            <p:cNvGrpSpPr/>
+            <p:nvPr/>
+          </p:nvGrpSpPr>
+          <p:grpSpPr>
+            <a:xfrm>
+              <a:off x="1878226" y="177994"/>
+              <a:ext cx="4606722" cy="3831777"/>
+              <a:chOff x="1995614" y="233596"/>
+              <a:chExt cx="4606722" cy="3831777"/>
+            </a:xfrm>
+          </p:grpSpPr>
+          <p:pic>
+            <p:nvPicPr>
+              <p:cNvPr id="4" name="Picture 3">
+                <a:extLst>
+                  <a:ext uri="{FF2B5EF4-FFF2-40B4-BE49-F238E27FC236}">
+                    <a16:creationId xmlns:a16="http://schemas.microsoft.com/office/drawing/2014/main" id="{E5488DEC-F438-B049-A9C7-28C02A20F09D}"/>
+                  </a:ext>
+                </a:extLst>
+              </p:cNvPr>
+              <p:cNvPicPr>
+                <a:picLocks noChangeAspect="1"/>
+              </p:cNvPicPr>
+              <p:nvPr/>
+            </p:nvPicPr>
+            <p:blipFill rotWithShape="1">
+              <a:blip r:embed="rId2"/>
+              <a:srcRect l="4039" t="19035" b="13398"/>
+              <a:stretch/>
+            </p:blipFill>
+            <p:spPr>
+              <a:xfrm>
+                <a:off x="1995614" y="2984156"/>
+                <a:ext cx="4606721" cy="1081217"/>
+              </a:xfrm>
+              <a:prstGeom prst="rect">
+                <a:avLst/>
+              </a:prstGeom>
+            </p:spPr>
+          </p:pic>
+          <p:pic>
+            <p:nvPicPr>
+              <p:cNvPr id="8" name="Picture 7">
+                <a:extLst>
+                  <a:ext uri="{FF2B5EF4-FFF2-40B4-BE49-F238E27FC236}">
+                    <a16:creationId xmlns:a16="http://schemas.microsoft.com/office/drawing/2014/main" id="{A192390E-8138-824F-A10C-7EB93B467732}"/>
+                  </a:ext>
+                </a:extLst>
+              </p:cNvPr>
+              <p:cNvPicPr>
+                <a:picLocks noChangeAspect="1"/>
+              </p:cNvPicPr>
+              <p:nvPr/>
+            </p:nvPicPr>
+            <p:blipFill rotWithShape="1">
+              <a:blip r:embed="rId3"/>
+              <a:srcRect l="4039" t="16366" b="12646"/>
+              <a:stretch/>
+            </p:blipFill>
+            <p:spPr>
+              <a:xfrm>
+                <a:off x="1995616" y="1718458"/>
+                <a:ext cx="4606720" cy="1135953"/>
+              </a:xfrm>
+              <a:prstGeom prst="rect">
+                <a:avLst/>
+              </a:prstGeom>
+            </p:spPr>
+          </p:pic>
+          <p:pic>
+            <p:nvPicPr>
+              <p:cNvPr id="6" name="Picture 5">
+                <a:extLst>
+                  <a:ext uri="{FF2B5EF4-FFF2-40B4-BE49-F238E27FC236}">
+                    <a16:creationId xmlns:a16="http://schemas.microsoft.com/office/drawing/2014/main" id="{044A1A8B-9507-984F-AFD7-CFE213186E50}"/>
+                  </a:ext>
+                </a:extLst>
+              </p:cNvPr>
+              <p:cNvPicPr>
+                <a:picLocks noChangeAspect="1"/>
+              </p:cNvPicPr>
+              <p:nvPr/>
+            </p:nvPicPr>
+            <p:blipFill rotWithShape="1">
+              <a:blip r:embed="rId4"/>
+              <a:srcRect l="4039" b="11895"/>
+              <a:stretch/>
+            </p:blipFill>
+            <p:spPr>
+              <a:xfrm>
+                <a:off x="1995616" y="233596"/>
+                <a:ext cx="4606720" cy="1409853"/>
+              </a:xfrm>
+              <a:prstGeom prst="rect">
+                <a:avLst/>
+              </a:prstGeom>
+            </p:spPr>
+          </p:pic>
+        </p:grpSp>
         <p:sp>
           <p:nvSpPr>
             <p:cNvPr id="14" name="TextBox 13">
@@ -6592,7 +7178,7 @@
           </p:nvSpPr>
           <p:spPr>
             <a:xfrm rot="16200000">
-              <a:off x="1502759" y="1884662"/>
+              <a:off x="1053309" y="1884662"/>
               <a:ext cx="1192936" cy="290324"/>
             </a:xfrm>
             <a:prstGeom prst="rect">
@@ -6630,7 +7216,7 @@
           </p:nvSpPr>
           <p:spPr>
             <a:xfrm>
-              <a:off x="3268370" y="3998563"/>
+              <a:off x="2818920" y="3998563"/>
               <a:ext cx="2607259" cy="276999"/>
             </a:xfrm>
             <a:prstGeom prst="rect">
@@ -6655,256 +7241,169 @@
             </a:p>
           </p:txBody>
         </p:sp>
-        <p:sp>
-          <p:nvSpPr>
-            <p:cNvPr id="16" name="TextBox 15">
-              <a:extLst>
-                <a:ext uri="{FF2B5EF4-FFF2-40B4-BE49-F238E27FC236}">
-                  <a16:creationId xmlns:a16="http://schemas.microsoft.com/office/drawing/2014/main" id="{201B0EDC-48DF-0240-A77B-D79D2AA331C0}"/>
-                </a:ext>
-              </a:extLst>
-            </p:cNvPr>
-            <p:cNvSpPr txBox="1"/>
-            <p:nvPr/>
-          </p:nvSpPr>
-          <p:spPr>
-            <a:xfrm>
-              <a:off x="772346" y="880816"/>
-              <a:ext cx="914400" cy="461665"/>
-            </a:xfrm>
-            <a:prstGeom prst="rect">
-              <a:avLst/>
-            </a:prstGeom>
-            <a:noFill/>
-            <a:ln>
-              <a:solidFill>
-                <a:schemeClr val="tx1"/>
-              </a:solidFill>
-            </a:ln>
-          </p:spPr>
-          <p:txBody>
-            <a:bodyPr wrap="square" rtlCol="0" anchor="ctr">
-              <a:spAutoFit/>
-            </a:bodyPr>
-            <a:lstStyle/>
-            <a:p>
-              <a:pPr algn="ctr"/>
-              <a:r>
-                <a:rPr lang="en-US" sz="1200" b="1" dirty="0">
-                  <a:latin typeface="Arial" panose="020B0604020202020204" pitchFamily="34" charset="0"/>
-                  <a:cs typeface="Arial" panose="020B0604020202020204" pitchFamily="34" charset="0"/>
-                </a:rPr>
-                <a:t>PCGC</a:t>
-              </a:r>
-            </a:p>
-            <a:p>
-              <a:pPr algn="ctr"/>
-              <a:r>
-                <a:rPr lang="en-US" sz="1200" b="1" dirty="0">
-                  <a:latin typeface="Arial" panose="020B0604020202020204" pitchFamily="34" charset="0"/>
-                  <a:cs typeface="Arial" panose="020B0604020202020204" pitchFamily="34" charset="0"/>
-                </a:rPr>
-                <a:t>(n=441)</a:t>
-              </a:r>
-            </a:p>
-          </p:txBody>
-        </p:sp>
-        <p:sp>
-          <p:nvSpPr>
-            <p:cNvPr id="17" name="TextBox 16">
-              <a:extLst>
-                <a:ext uri="{FF2B5EF4-FFF2-40B4-BE49-F238E27FC236}">
-                  <a16:creationId xmlns:a16="http://schemas.microsoft.com/office/drawing/2014/main" id="{59B8B849-8B1C-4A42-8155-C6405AC77463}"/>
-                </a:ext>
-              </a:extLst>
-            </p:cNvPr>
-            <p:cNvSpPr txBox="1"/>
-            <p:nvPr/>
-          </p:nvSpPr>
-          <p:spPr>
-            <a:xfrm>
-              <a:off x="772346" y="2034064"/>
-              <a:ext cx="914400" cy="461665"/>
-            </a:xfrm>
-            <a:prstGeom prst="rect">
-              <a:avLst/>
-            </a:prstGeom>
-            <a:noFill/>
-            <a:ln>
-              <a:solidFill>
-                <a:schemeClr val="tx1"/>
-              </a:solidFill>
-            </a:ln>
-          </p:spPr>
-          <p:txBody>
-            <a:bodyPr wrap="square" rtlCol="0" anchor="ctr">
-              <a:spAutoFit/>
-            </a:bodyPr>
-            <a:lstStyle/>
-            <a:p>
-              <a:pPr algn="ctr"/>
-              <a:r>
-                <a:rPr lang="en-US" sz="1200" b="1" dirty="0">
-                  <a:latin typeface="Arial" panose="020B0604020202020204" pitchFamily="34" charset="0"/>
-                  <a:cs typeface="Arial" panose="020B0604020202020204" pitchFamily="34" charset="0"/>
-                </a:rPr>
-                <a:t>SFARI</a:t>
-              </a:r>
-            </a:p>
-            <a:p>
-              <a:pPr algn="ctr"/>
-              <a:r>
-                <a:rPr lang="en-US" sz="1200" b="1" dirty="0">
-                  <a:latin typeface="Arial" panose="020B0604020202020204" pitchFamily="34" charset="0"/>
-                  <a:cs typeface="Arial" panose="020B0604020202020204" pitchFamily="34" charset="0"/>
-                </a:rPr>
-                <a:t>(n=1,627)</a:t>
-              </a:r>
-            </a:p>
-          </p:txBody>
-        </p:sp>
-        <p:sp>
-          <p:nvSpPr>
-            <p:cNvPr id="18" name="TextBox 17">
-              <a:extLst>
-                <a:ext uri="{FF2B5EF4-FFF2-40B4-BE49-F238E27FC236}">
-                  <a16:creationId xmlns:a16="http://schemas.microsoft.com/office/drawing/2014/main" id="{383BFC13-B88B-5749-9A7E-CC2686D7F133}"/>
-                </a:ext>
-              </a:extLst>
-            </p:cNvPr>
-            <p:cNvSpPr txBox="1"/>
-            <p:nvPr/>
-          </p:nvSpPr>
-          <p:spPr>
-            <a:xfrm>
-              <a:off x="772346" y="3119293"/>
-              <a:ext cx="914400" cy="461665"/>
-            </a:xfrm>
-            <a:prstGeom prst="rect">
-              <a:avLst/>
-            </a:prstGeom>
-            <a:noFill/>
-            <a:ln>
-              <a:solidFill>
-                <a:schemeClr val="tx1"/>
-              </a:solidFill>
-            </a:ln>
-          </p:spPr>
-          <p:txBody>
-            <a:bodyPr wrap="square" rtlCol="0" anchor="ctr">
-              <a:spAutoFit/>
-            </a:bodyPr>
-            <a:lstStyle/>
-            <a:p>
-              <a:pPr algn="ctr"/>
-              <a:r>
-                <a:rPr lang="en-US" sz="1200" b="1" dirty="0">
-                  <a:latin typeface="Arial" panose="020B0604020202020204" pitchFamily="34" charset="0"/>
-                  <a:cs typeface="Arial" panose="020B0604020202020204" pitchFamily="34" charset="0"/>
-                </a:rPr>
-                <a:t>deCODE</a:t>
-              </a:r>
-            </a:p>
-            <a:p>
-              <a:pPr algn="ctr"/>
-              <a:r>
-                <a:rPr lang="en-US" sz="1200" b="1" dirty="0">
-                  <a:latin typeface="Arial" panose="020B0604020202020204" pitchFamily="34" charset="0"/>
-                  <a:cs typeface="Arial" panose="020B0604020202020204" pitchFamily="34" charset="0"/>
-                </a:rPr>
-                <a:t>(n=1,323)</a:t>
-              </a:r>
-            </a:p>
-          </p:txBody>
-        </p:sp>
-        <p:pic>
-          <p:nvPicPr>
-            <p:cNvPr id="20" name="Picture 19" descr="A screenshot of a cell phone&#13;&#10;&#13;&#10;Description automatically generated">
-              <a:extLst>
-                <a:ext uri="{FF2B5EF4-FFF2-40B4-BE49-F238E27FC236}">
-                  <a16:creationId xmlns:a16="http://schemas.microsoft.com/office/drawing/2014/main" id="{CD9753CA-E525-1543-87C0-107D411245AC}"/>
-                </a:ext>
-              </a:extLst>
-            </p:cNvPr>
-            <p:cNvPicPr>
-              <a:picLocks noChangeAspect="1"/>
-            </p:cNvPicPr>
-            <p:nvPr/>
-          </p:nvPicPr>
-          <p:blipFill rotWithShape="1">
-            <a:blip r:embed="rId2"/>
-            <a:srcRect l="4167" t="17811" b="11905"/>
-            <a:stretch/>
-          </p:blipFill>
-          <p:spPr>
-            <a:xfrm>
-              <a:off x="2294736" y="1849696"/>
-              <a:ext cx="4518875" cy="1104719"/>
-            </a:xfrm>
-            <a:prstGeom prst="rect">
-              <a:avLst/>
-            </a:prstGeom>
-          </p:spPr>
-        </p:pic>
-        <p:pic>
-          <p:nvPicPr>
-            <p:cNvPr id="22" name="Picture 21" descr="A screenshot of a cell phone&#13;&#10;&#13;&#10;Description automatically generated">
-              <a:extLst>
-                <a:ext uri="{FF2B5EF4-FFF2-40B4-BE49-F238E27FC236}">
-                  <a16:creationId xmlns:a16="http://schemas.microsoft.com/office/drawing/2014/main" id="{90D6AAF7-8B78-BC41-8AA2-EED557F4A735}"/>
-                </a:ext>
-              </a:extLst>
-            </p:cNvPr>
-            <p:cNvPicPr>
-              <a:picLocks noChangeAspect="1"/>
-            </p:cNvPicPr>
-            <p:nvPr/>
-          </p:nvPicPr>
-          <p:blipFill rotWithShape="1">
-            <a:blip r:embed="rId3"/>
-            <a:srcRect l="4167" b="11905"/>
-            <a:stretch/>
-          </p:blipFill>
-          <p:spPr>
-            <a:xfrm>
-              <a:off x="2294736" y="425413"/>
-              <a:ext cx="4518873" cy="1384676"/>
-            </a:xfrm>
-            <a:prstGeom prst="rect">
-              <a:avLst/>
-            </a:prstGeom>
-          </p:spPr>
-        </p:pic>
-        <p:pic>
-          <p:nvPicPr>
-            <p:cNvPr id="24" name="Picture 23" descr="A screenshot of a cell phone&#13;&#10;&#13;&#10;Description automatically generated">
-              <a:extLst>
-                <a:ext uri="{FF2B5EF4-FFF2-40B4-BE49-F238E27FC236}">
-                  <a16:creationId xmlns:a16="http://schemas.microsoft.com/office/drawing/2014/main" id="{BB547B5B-B607-914C-BFF9-7681E7B1A4DA}"/>
-                </a:ext>
-              </a:extLst>
-            </p:cNvPr>
-            <p:cNvPicPr>
-              <a:picLocks noChangeAspect="1"/>
-            </p:cNvPicPr>
-            <p:nvPr/>
-          </p:nvPicPr>
-          <p:blipFill rotWithShape="1">
-            <a:blip r:embed="rId4"/>
-            <a:srcRect l="4167" t="21016" b="11905"/>
-            <a:stretch/>
-          </p:blipFill>
-          <p:spPr>
-            <a:xfrm>
-              <a:off x="2294736" y="2917596"/>
-              <a:ext cx="4518877" cy="1054345"/>
-            </a:xfrm>
-            <a:prstGeom prst="rect">
-              <a:avLst/>
-            </a:prstGeom>
-          </p:spPr>
-        </p:pic>
       </p:grpSp>
+      <p:sp>
+        <p:nvSpPr>
+          <p:cNvPr id="16" name="TextBox 15">
+            <a:extLst>
+              <a:ext uri="{FF2B5EF4-FFF2-40B4-BE49-F238E27FC236}">
+                <a16:creationId xmlns:a16="http://schemas.microsoft.com/office/drawing/2014/main" id="{201B0EDC-48DF-0240-A77B-D79D2AA331C0}"/>
+              </a:ext>
+            </a:extLst>
+          </p:cNvPr>
+          <p:cNvSpPr txBox="1"/>
+          <p:nvPr/>
+        </p:nvSpPr>
+        <p:spPr>
+          <a:xfrm>
+            <a:off x="322896" y="880816"/>
+            <a:ext cx="914400" cy="461665"/>
+          </a:xfrm>
+          <a:prstGeom prst="rect">
+            <a:avLst/>
+          </a:prstGeom>
+          <a:noFill/>
+          <a:ln>
+            <a:solidFill>
+              <a:schemeClr val="tx1"/>
+            </a:solidFill>
+          </a:ln>
+        </p:spPr>
+        <p:txBody>
+          <a:bodyPr wrap="square" rtlCol="0" anchor="ctr">
+            <a:spAutoFit/>
+          </a:bodyPr>
+          <a:lstStyle/>
+          <a:p>
+            <a:pPr algn="ctr"/>
+            <a:r>
+              <a:rPr lang="en-US" sz="1200" b="1" dirty="0">
+                <a:latin typeface="Arial" panose="020B0604020202020204" pitchFamily="34" charset="0"/>
+                <a:cs typeface="Arial" panose="020B0604020202020204" pitchFamily="34" charset="0"/>
+              </a:rPr>
+              <a:t>PCGC</a:t>
+            </a:r>
+          </a:p>
+          <a:p>
+            <a:pPr algn="ctr"/>
+            <a:r>
+              <a:rPr lang="en-US" sz="1200" b="1" dirty="0">
+                <a:latin typeface="Arial" panose="020B0604020202020204" pitchFamily="34" charset="0"/>
+                <a:cs typeface="Arial" panose="020B0604020202020204" pitchFamily="34" charset="0"/>
+              </a:rPr>
+              <a:t>(n=441)</a:t>
+            </a:r>
+          </a:p>
+        </p:txBody>
+      </p:sp>
+      <p:sp>
+        <p:nvSpPr>
+          <p:cNvPr id="17" name="TextBox 16">
+            <a:extLst>
+              <a:ext uri="{FF2B5EF4-FFF2-40B4-BE49-F238E27FC236}">
+                <a16:creationId xmlns:a16="http://schemas.microsoft.com/office/drawing/2014/main" id="{59B8B849-8B1C-4A42-8155-C6405AC77463}"/>
+              </a:ext>
+            </a:extLst>
+          </p:cNvPr>
+          <p:cNvSpPr txBox="1"/>
+          <p:nvPr/>
+        </p:nvSpPr>
+        <p:spPr>
+          <a:xfrm>
+            <a:off x="322896" y="2034064"/>
+            <a:ext cx="914400" cy="461665"/>
+          </a:xfrm>
+          <a:prstGeom prst="rect">
+            <a:avLst/>
+          </a:prstGeom>
+          <a:noFill/>
+          <a:ln>
+            <a:solidFill>
+              <a:schemeClr val="tx1"/>
+            </a:solidFill>
+          </a:ln>
+        </p:spPr>
+        <p:txBody>
+          <a:bodyPr wrap="square" rtlCol="0" anchor="ctr">
+            <a:spAutoFit/>
+          </a:bodyPr>
+          <a:lstStyle/>
+          <a:p>
+            <a:pPr algn="ctr"/>
+            <a:r>
+              <a:rPr lang="en-US" sz="1200" b="1" dirty="0">
+                <a:latin typeface="Arial" panose="020B0604020202020204" pitchFamily="34" charset="0"/>
+                <a:cs typeface="Arial" panose="020B0604020202020204" pitchFamily="34" charset="0"/>
+              </a:rPr>
+              <a:t>SFARI</a:t>
+            </a:r>
+          </a:p>
+          <a:p>
+            <a:pPr algn="ctr"/>
+            <a:r>
+              <a:rPr lang="en-US" sz="1200" b="1" dirty="0">
+                <a:latin typeface="Arial" panose="020B0604020202020204" pitchFamily="34" charset="0"/>
+                <a:cs typeface="Arial" panose="020B0604020202020204" pitchFamily="34" charset="0"/>
+              </a:rPr>
+              <a:t>(n=1,627)</a:t>
+            </a:r>
+          </a:p>
+        </p:txBody>
+      </p:sp>
+      <p:sp>
+        <p:nvSpPr>
+          <p:cNvPr id="18" name="TextBox 17">
+            <a:extLst>
+              <a:ext uri="{FF2B5EF4-FFF2-40B4-BE49-F238E27FC236}">
+                <a16:creationId xmlns:a16="http://schemas.microsoft.com/office/drawing/2014/main" id="{383BFC13-B88B-5749-9A7E-CC2686D7F133}"/>
+              </a:ext>
+            </a:extLst>
+          </p:cNvPr>
+          <p:cNvSpPr txBox="1"/>
+          <p:nvPr/>
+        </p:nvSpPr>
+        <p:spPr>
+          <a:xfrm>
+            <a:off x="322896" y="3119293"/>
+            <a:ext cx="914400" cy="461665"/>
+          </a:xfrm>
+          <a:prstGeom prst="rect">
+            <a:avLst/>
+          </a:prstGeom>
+          <a:noFill/>
+          <a:ln>
+            <a:solidFill>
+              <a:schemeClr val="tx1"/>
+            </a:solidFill>
+          </a:ln>
+        </p:spPr>
+        <p:txBody>
+          <a:bodyPr wrap="square" rtlCol="0" anchor="ctr">
+            <a:spAutoFit/>
+          </a:bodyPr>
+          <a:lstStyle/>
+          <a:p>
+            <a:pPr algn="ctr"/>
+            <a:r>
+              <a:rPr lang="en-US" sz="1200" b="1" dirty="0">
+                <a:latin typeface="Arial" panose="020B0604020202020204" pitchFamily="34" charset="0"/>
+                <a:cs typeface="Arial" panose="020B0604020202020204" pitchFamily="34" charset="0"/>
+              </a:rPr>
+              <a:t>deCODE</a:t>
+            </a:r>
+          </a:p>
+          <a:p>
+            <a:pPr algn="ctr"/>
+            <a:r>
+              <a:rPr lang="en-US" sz="1200" b="1" dirty="0">
+                <a:latin typeface="Arial" panose="020B0604020202020204" pitchFamily="34" charset="0"/>
+                <a:cs typeface="Arial" panose="020B0604020202020204" pitchFamily="34" charset="0"/>
+              </a:rPr>
+              <a:t>(n=1,323)</a:t>
+            </a:r>
+          </a:p>
+        </p:txBody>
+      </p:sp>
       <p:graphicFrame>
         <p:nvGraphicFramePr>
           <p:cNvPr id="27" name="Table 26">
@@ -6920,7 +7419,7 @@
           <p:nvPr>
             <p:extLst>
               <p:ext uri="{D42A27DB-BD31-4B8C-83A1-F6EECF244321}">
-                <p14:modId xmlns:p14="http://schemas.microsoft.com/office/powerpoint/2010/main" val="578238426"/>
+                <p14:modId xmlns:p14="http://schemas.microsoft.com/office/powerpoint/2010/main" val="3430866501"/>
               </p:ext>
             </p:extLst>
           </p:nvPr>
@@ -7132,7 +7631,7 @@
                           <a:latin typeface="Arial" panose="020B0604020202020204" pitchFamily="34" charset="0"/>
                           <a:cs typeface="Arial" panose="020B0604020202020204" pitchFamily="34" charset="0"/>
                         </a:rPr>
-                        <a:t>0.13</a:t>
+                        <a:t>0.14</a:t>
                       </a:r>
                       <a:endParaRPr lang="en-US" sz="1000" b="0" i="0" u="none" strike="noStrike" dirty="0">
                         <a:solidFill>
@@ -7226,7 +7725,7 @@
                           <a:latin typeface="Arial" panose="020B0604020202020204" pitchFamily="34" charset="0"/>
                           <a:cs typeface="Arial" panose="020B0604020202020204" pitchFamily="34" charset="0"/>
                         </a:rPr>
-                        <a:t>0.78</a:t>
+                        <a:t>0.61</a:t>
                       </a:r>
                     </a:p>
                   </a:txBody>
@@ -7273,7 +7772,7 @@
                           <a:latin typeface="Arial" panose="020B0604020202020204" pitchFamily="34" charset="0"/>
                           <a:cs typeface="Arial" panose="020B0604020202020204" pitchFamily="34" charset="0"/>
                         </a:rPr>
-                        <a:t>1.0x10</a:t>
+                        <a:t>1.9x10</a:t>
                       </a:r>
                       <a:r>
                         <a:rPr lang="en-US" sz="1000" b="1" u="none" strike="noStrike" baseline="30000" dirty="0">
@@ -7372,7 +7871,7 @@
                           <a:latin typeface="Arial" panose="020B0604020202020204" pitchFamily="34" charset="0"/>
                           <a:cs typeface="Arial" panose="020B0604020202020204" pitchFamily="34" charset="0"/>
                         </a:rPr>
-                        <a:t>0.27</a:t>
+                        <a:t>0.14</a:t>
                       </a:r>
                       <a:endParaRPr lang="en-US" sz="1000" b="0" i="0" u="none" strike="noStrike" dirty="0">
                         <a:solidFill>
@@ -7420,7 +7919,7 @@
                           <a:latin typeface="Arial" panose="020B0604020202020204" pitchFamily="34" charset="0"/>
                           <a:cs typeface="Arial" panose="020B0604020202020204" pitchFamily="34" charset="0"/>
                         </a:rPr>
-                        <a:t>2.4x10</a:t>
+                        <a:t>2.8x10</a:t>
                       </a:r>
                       <a:r>
                         <a:rPr lang="en-US" sz="1000" b="1" u="none" strike="noStrike" baseline="30000" dirty="0">
@@ -7497,7 +7996,7 @@
                           <a:latin typeface="Arial" panose="020B0604020202020204" pitchFamily="34" charset="0"/>
                           <a:cs typeface="Arial" panose="020B0604020202020204" pitchFamily="34" charset="0"/>
                         </a:rPr>
-                        <a:t>0.11</a:t>
+                        <a:t>0.04</a:t>
                       </a:r>
                       <a:endParaRPr lang="en-US" sz="1000" b="0" i="0" u="none" strike="noStrike" dirty="0">
                         <a:solidFill>
@@ -7523,7 +8022,7 @@
                           <a:latin typeface="Arial" panose="020B0604020202020204" pitchFamily="34" charset="0"/>
                           <a:cs typeface="Arial" panose="020B0604020202020204" pitchFamily="34" charset="0"/>
                         </a:rPr>
-                        <a:t>3.6x10</a:t>
+                        <a:t>1.4x10</a:t>
                       </a:r>
                       <a:r>
                         <a:rPr lang="en-US" sz="1000" b="1" u="none" strike="noStrike" baseline="30000" dirty="0">
@@ -8060,4 +8559,299 @@
     </a:ext>
   </a:extLst>
 </a:theme>
+</file>
+
+<file path=ppt/theme/theme2.xml><?xml version="1.0" encoding="utf-8"?>
+<a:theme xmlns:a="http://schemas.openxmlformats.org/drawingml/2006/main" name="Office Theme">
+  <a:themeElements>
+    <a:clrScheme name="Office">
+      <a:dk1>
+        <a:sysClr val="windowText" lastClr="000000"/>
+      </a:dk1>
+      <a:lt1>
+        <a:sysClr val="window" lastClr="FFFFFF"/>
+      </a:lt1>
+      <a:dk2>
+        <a:srgbClr val="44546A"/>
+      </a:dk2>
+      <a:lt2>
+        <a:srgbClr val="E7E6E6"/>
+      </a:lt2>
+      <a:accent1>
+        <a:srgbClr val="4472C4"/>
+      </a:accent1>
+      <a:accent2>
+        <a:srgbClr val="ED7D31"/>
+      </a:accent2>
+      <a:accent3>
+        <a:srgbClr val="A5A5A5"/>
+      </a:accent3>
+      <a:accent4>
+        <a:srgbClr val="FFC000"/>
+      </a:accent4>
+      <a:accent5>
+        <a:srgbClr val="5B9BD5"/>
+      </a:accent5>
+      <a:accent6>
+        <a:srgbClr val="70AD47"/>
+      </a:accent6>
+      <a:hlink>
+        <a:srgbClr val="0563C1"/>
+      </a:hlink>
+      <a:folHlink>
+        <a:srgbClr val="954F72"/>
+      </a:folHlink>
+    </a:clrScheme>
+    <a:fontScheme name="Office">
+      <a:majorFont>
+        <a:latin typeface="Calibri Light" panose="020F0302020204030204"/>
+        <a:ea typeface=""/>
+        <a:cs typeface=""/>
+        <a:font script="Jpan" typeface="游ゴシック Light"/>
+        <a:font script="Hang" typeface="맑은 고딕"/>
+        <a:font script="Hans" typeface="等线 Light"/>
+        <a:font script="Hant" typeface="新細明體"/>
+        <a:font script="Arab" typeface="Times New Roman"/>
+        <a:font script="Hebr" typeface="Times New Roman"/>
+        <a:font script="Thai" typeface="Angsana New"/>
+        <a:font script="Ethi" typeface="Nyala"/>
+        <a:font script="Beng" typeface="Vrinda"/>
+        <a:font script="Gujr" typeface="Shruti"/>
+        <a:font script="Khmr" typeface="MoolBoran"/>
+        <a:font script="Knda" typeface="Tunga"/>
+        <a:font script="Guru" typeface="Raavi"/>
+        <a:font script="Cans" typeface="Euphemia"/>
+        <a:font script="Cher" typeface="Plantagenet Cherokee"/>
+        <a:font script="Yiii" typeface="Microsoft Yi Baiti"/>
+        <a:font script="Tibt" typeface="Microsoft Himalaya"/>
+        <a:font script="Thaa" typeface="MV Boli"/>
+        <a:font script="Deva" typeface="Mangal"/>
+        <a:font script="Telu" typeface="Gautami"/>
+        <a:font script="Taml" typeface="Latha"/>
+        <a:font script="Syrc" typeface="Estrangelo Edessa"/>
+        <a:font script="Orya" typeface="Kalinga"/>
+        <a:font script="Mlym" typeface="Kartika"/>
+        <a:font script="Laoo" typeface="DokChampa"/>
+        <a:font script="Sinh" typeface="Iskoola Pota"/>
+        <a:font script="Mong" typeface="Mongolian Baiti"/>
+        <a:font script="Viet" typeface="Times New Roman"/>
+        <a:font script="Uigh" typeface="Microsoft Uighur"/>
+        <a:font script="Geor" typeface="Sylfaen"/>
+        <a:font script="Armn" typeface="Arial"/>
+        <a:font script="Bugi" typeface="Leelawadee UI"/>
+        <a:font script="Bopo" typeface="Microsoft JhengHei"/>
+        <a:font script="Java" typeface="Javanese Text"/>
+        <a:font script="Lisu" typeface="Segoe UI"/>
+        <a:font script="Mymr" typeface="Myanmar Text"/>
+        <a:font script="Nkoo" typeface="Ebrima"/>
+        <a:font script="Olck" typeface="Nirmala UI"/>
+        <a:font script="Osma" typeface="Ebrima"/>
+        <a:font script="Phag" typeface="Phagspa"/>
+        <a:font script="Syrn" typeface="Estrangelo Edessa"/>
+        <a:font script="Syrj" typeface="Estrangelo Edessa"/>
+        <a:font script="Syre" typeface="Estrangelo Edessa"/>
+        <a:font script="Sora" typeface="Nirmala UI"/>
+        <a:font script="Tale" typeface="Microsoft Tai Le"/>
+        <a:font script="Talu" typeface="Microsoft New Tai Lue"/>
+        <a:font script="Tfng" typeface="Ebrima"/>
+      </a:majorFont>
+      <a:minorFont>
+        <a:latin typeface="Calibri" panose="020F0502020204030204"/>
+        <a:ea typeface=""/>
+        <a:cs typeface=""/>
+        <a:font script="Jpan" typeface="游ゴシック"/>
+        <a:font script="Hang" typeface="맑은 고딕"/>
+        <a:font script="Hans" typeface="等线"/>
+        <a:font script="Hant" typeface="新細明體"/>
+        <a:font script="Arab" typeface="Arial"/>
+        <a:font script="Hebr" typeface="Arial"/>
+        <a:font script="Thai" typeface="Cordia New"/>
+        <a:font script="Ethi" typeface="Nyala"/>
+        <a:font script="Beng" typeface="Vrinda"/>
+        <a:font script="Gujr" typeface="Shruti"/>
+        <a:font script="Khmr" typeface="DaunPenh"/>
+        <a:font script="Knda" typeface="Tunga"/>
+        <a:font script="Guru" typeface="Raavi"/>
+        <a:font script="Cans" typeface="Euphemia"/>
+        <a:font script="Cher" typeface="Plantagenet Cherokee"/>
+        <a:font script="Yiii" typeface="Microsoft Yi Baiti"/>
+        <a:font script="Tibt" typeface="Microsoft Himalaya"/>
+        <a:font script="Thaa" typeface="MV Boli"/>
+        <a:font script="Deva" typeface="Mangal"/>
+        <a:font script="Telu" typeface="Gautami"/>
+        <a:font script="Taml" typeface="Latha"/>
+        <a:font script="Syrc" typeface="Estrangelo Edessa"/>
+        <a:font script="Orya" typeface="Kalinga"/>
+        <a:font script="Mlym" typeface="Kartika"/>
+        <a:font script="Laoo" typeface="DokChampa"/>
+        <a:font script="Sinh" typeface="Iskoola Pota"/>
+        <a:font script="Mong" typeface="Mongolian Baiti"/>
+        <a:font script="Viet" typeface="Arial"/>
+        <a:font script="Uigh" typeface="Microsoft Uighur"/>
+        <a:font script="Geor" typeface="Sylfaen"/>
+        <a:font script="Armn" typeface="Arial"/>
+        <a:font script="Bugi" typeface="Leelawadee UI"/>
+        <a:font script="Bopo" typeface="Microsoft JhengHei"/>
+        <a:font script="Java" typeface="Javanese Text"/>
+        <a:font script="Lisu" typeface="Segoe UI"/>
+        <a:font script="Mymr" typeface="Myanmar Text"/>
+        <a:font script="Nkoo" typeface="Ebrima"/>
+        <a:font script="Olck" typeface="Nirmala UI"/>
+        <a:font script="Osma" typeface="Ebrima"/>
+        <a:font script="Phag" typeface="Phagspa"/>
+        <a:font script="Syrn" typeface="Estrangelo Edessa"/>
+        <a:font script="Syrj" typeface="Estrangelo Edessa"/>
+        <a:font script="Syre" typeface="Estrangelo Edessa"/>
+        <a:font script="Sora" typeface="Nirmala UI"/>
+        <a:font script="Tale" typeface="Microsoft Tai Le"/>
+        <a:font script="Talu" typeface="Microsoft New Tai Lue"/>
+        <a:font script="Tfng" typeface="Ebrima"/>
+      </a:minorFont>
+    </a:fontScheme>
+    <a:fmtScheme name="Office">
+      <a:fillStyleLst>
+        <a:solidFill>
+          <a:schemeClr val="phClr"/>
+        </a:solidFill>
+        <a:gradFill rotWithShape="1">
+          <a:gsLst>
+            <a:gs pos="0">
+              <a:schemeClr val="phClr">
+                <a:lumMod val="110000"/>
+                <a:satMod val="105000"/>
+                <a:tint val="67000"/>
+              </a:schemeClr>
+            </a:gs>
+            <a:gs pos="50000">
+              <a:schemeClr val="phClr">
+                <a:lumMod val="105000"/>
+                <a:satMod val="103000"/>
+                <a:tint val="73000"/>
+              </a:schemeClr>
+            </a:gs>
+            <a:gs pos="100000">
+              <a:schemeClr val="phClr">
+                <a:lumMod val="105000"/>
+                <a:satMod val="109000"/>
+                <a:tint val="81000"/>
+              </a:schemeClr>
+            </a:gs>
+          </a:gsLst>
+          <a:lin ang="5400000" scaled="0"/>
+        </a:gradFill>
+        <a:gradFill rotWithShape="1">
+          <a:gsLst>
+            <a:gs pos="0">
+              <a:schemeClr val="phClr">
+                <a:satMod val="103000"/>
+                <a:lumMod val="102000"/>
+                <a:tint val="94000"/>
+              </a:schemeClr>
+            </a:gs>
+            <a:gs pos="50000">
+              <a:schemeClr val="phClr">
+                <a:satMod val="110000"/>
+                <a:lumMod val="100000"/>
+                <a:shade val="100000"/>
+              </a:schemeClr>
+            </a:gs>
+            <a:gs pos="100000">
+              <a:schemeClr val="phClr">
+                <a:lumMod val="99000"/>
+                <a:satMod val="120000"/>
+                <a:shade val="78000"/>
+              </a:schemeClr>
+            </a:gs>
+          </a:gsLst>
+          <a:lin ang="5400000" scaled="0"/>
+        </a:gradFill>
+      </a:fillStyleLst>
+      <a:lnStyleLst>
+        <a:ln w="6350" cap="flat" cmpd="sng" algn="ctr">
+          <a:solidFill>
+            <a:schemeClr val="phClr"/>
+          </a:solidFill>
+          <a:prstDash val="solid"/>
+          <a:miter lim="800000"/>
+        </a:ln>
+        <a:ln w="12700" cap="flat" cmpd="sng" algn="ctr">
+          <a:solidFill>
+            <a:schemeClr val="phClr"/>
+          </a:solidFill>
+          <a:prstDash val="solid"/>
+          <a:miter lim="800000"/>
+        </a:ln>
+        <a:ln w="19050" cap="flat" cmpd="sng" algn="ctr">
+          <a:solidFill>
+            <a:schemeClr val="phClr"/>
+          </a:solidFill>
+          <a:prstDash val="solid"/>
+          <a:miter lim="800000"/>
+        </a:ln>
+      </a:lnStyleLst>
+      <a:effectStyleLst>
+        <a:effectStyle>
+          <a:effectLst/>
+        </a:effectStyle>
+        <a:effectStyle>
+          <a:effectLst/>
+        </a:effectStyle>
+        <a:effectStyle>
+          <a:effectLst>
+            <a:outerShdw blurRad="57150" dist="19050" dir="5400000" algn="ctr" rotWithShape="0">
+              <a:srgbClr val="000000">
+                <a:alpha val="63000"/>
+              </a:srgbClr>
+            </a:outerShdw>
+          </a:effectLst>
+        </a:effectStyle>
+      </a:effectStyleLst>
+      <a:bgFillStyleLst>
+        <a:solidFill>
+          <a:schemeClr val="phClr"/>
+        </a:solidFill>
+        <a:solidFill>
+          <a:schemeClr val="phClr">
+            <a:tint val="95000"/>
+            <a:satMod val="170000"/>
+          </a:schemeClr>
+        </a:solidFill>
+        <a:gradFill rotWithShape="1">
+          <a:gsLst>
+            <a:gs pos="0">
+              <a:schemeClr val="phClr">
+                <a:tint val="93000"/>
+                <a:satMod val="150000"/>
+                <a:shade val="98000"/>
+                <a:lumMod val="102000"/>
+              </a:schemeClr>
+            </a:gs>
+            <a:gs pos="50000">
+              <a:schemeClr val="phClr">
+                <a:tint val="98000"/>
+                <a:satMod val="130000"/>
+                <a:shade val="90000"/>
+                <a:lumMod val="103000"/>
+              </a:schemeClr>
+            </a:gs>
+            <a:gs pos="100000">
+              <a:schemeClr val="phClr">
+                <a:shade val="63000"/>
+                <a:satMod val="120000"/>
+              </a:schemeClr>
+            </a:gs>
+          </a:gsLst>
+          <a:lin ang="5400000" scaled="0"/>
+        </a:gradFill>
+      </a:bgFillStyleLst>
+    </a:fmtScheme>
+  </a:themeElements>
+  <a:objectDefaults/>
+  <a:extraClrSchemeLst/>
+  <a:extLst>
+    <a:ext uri="{05A4C25C-085E-4340-85A3-A5531E510DB2}">
+      <thm15:themeFamily xmlns:thm15="http://schemas.microsoft.com/office/thememl/2012/main" name="Office Theme" id="{62F939B6-93AF-4DB8-9C6B-D6C7DFDC589F}" vid="{4A3C46E8-61CC-4603-A589-7422A47A8E4A}"/>
+    </a:ext>
+  </a:extLst>
+</a:theme>
 </file>
</xml_diff>